<commit_message>
02 will require work
</commit_message>
<xml_diff>
--- a/notes/images.pptx
+++ b/notes/images.pptx
@@ -4,8 +4,13 @@
   <p:sldMasterIdLst>
     <p:sldMasterId id="2147483648" r:id="rId1"/>
   </p:sldMasterIdLst>
+  <p:notesMasterIdLst>
+    <p:notesMasterId r:id="rId5"/>
+  </p:notesMasterIdLst>
   <p:sldIdLst>
     <p:sldId id="267" r:id="rId2"/>
+    <p:sldId id="256" r:id="rId3"/>
+    <p:sldId id="257" r:id="rId4"/>
   </p:sldIdLst>
   <p:sldSz cx="12192000" cy="6858000"/>
   <p:notesSz cx="6858000" cy="9144000"/>
@@ -112,6 +117,563 @@
 </p:presentation>
 </file>
 
+<file path=ppt/notesMasters/notesMaster1.xml><?xml version="1.0" encoding="utf-8"?>
+<p:notesMaster xmlns:a="http://schemas.openxmlformats.org/drawingml/2006/main" xmlns:r="http://schemas.openxmlformats.org/officeDocument/2006/relationships" xmlns:p="http://schemas.openxmlformats.org/presentationml/2006/main">
+  <p:cSld>
+    <p:bg>
+      <p:bgRef idx="1001">
+        <a:schemeClr val="bg1"/>
+      </p:bgRef>
+    </p:bg>
+    <p:spTree>
+      <p:nvGrpSpPr>
+        <p:cNvPr id="1" name=""/>
+        <p:cNvGrpSpPr/>
+        <p:nvPr/>
+      </p:nvGrpSpPr>
+      <p:grpSpPr>
+        <a:xfrm>
+          <a:off x="0" y="0"/>
+          <a:ext cx="0" cy="0"/>
+          <a:chOff x="0" y="0"/>
+          <a:chExt cx="0" cy="0"/>
+        </a:xfrm>
+      </p:grpSpPr>
+      <p:sp>
+        <p:nvSpPr>
+          <p:cNvPr id="2" name="Header Placeholder 1"/>
+          <p:cNvSpPr>
+            <a:spLocks noGrp="1"/>
+          </p:cNvSpPr>
+          <p:nvPr>
+            <p:ph type="hdr" sz="quarter"/>
+          </p:nvPr>
+        </p:nvSpPr>
+        <p:spPr>
+          <a:xfrm>
+            <a:off x="0" y="0"/>
+            <a:ext cx="2971800" cy="458788"/>
+          </a:xfrm>
+          <a:prstGeom prst="rect">
+            <a:avLst/>
+          </a:prstGeom>
+        </p:spPr>
+        <p:txBody>
+          <a:bodyPr vert="horz" lIns="91440" tIns="45720" rIns="91440" bIns="45720" rtlCol="0"/>
+          <a:lstStyle>
+            <a:lvl1pPr algn="l">
+              <a:defRPr sz="1200"/>
+            </a:lvl1pPr>
+          </a:lstStyle>
+          <a:p>
+            <a:endParaRPr lang="en-US"/>
+          </a:p>
+        </p:txBody>
+      </p:sp>
+      <p:sp>
+        <p:nvSpPr>
+          <p:cNvPr id="3" name="Date Placeholder 2"/>
+          <p:cNvSpPr>
+            <a:spLocks noGrp="1"/>
+          </p:cNvSpPr>
+          <p:nvPr>
+            <p:ph type="dt" idx="1"/>
+          </p:nvPr>
+        </p:nvSpPr>
+        <p:spPr>
+          <a:xfrm>
+            <a:off x="3884613" y="0"/>
+            <a:ext cx="2971800" cy="458788"/>
+          </a:xfrm>
+          <a:prstGeom prst="rect">
+            <a:avLst/>
+          </a:prstGeom>
+        </p:spPr>
+        <p:txBody>
+          <a:bodyPr vert="horz" lIns="91440" tIns="45720" rIns="91440" bIns="45720" rtlCol="0"/>
+          <a:lstStyle>
+            <a:lvl1pPr algn="r">
+              <a:defRPr sz="1200"/>
+            </a:lvl1pPr>
+          </a:lstStyle>
+          <a:p>
+            <a:fld id="{E3948992-F585-1047-B5EB-9D6B54EE0AE7}" type="datetimeFigureOut">
+              <a:rPr lang="en-US" smtClean="0"/>
+              <a:t>1/13/25</a:t>
+            </a:fld>
+            <a:endParaRPr lang="en-US"/>
+          </a:p>
+        </p:txBody>
+      </p:sp>
+      <p:sp>
+        <p:nvSpPr>
+          <p:cNvPr id="4" name="Slide Image Placeholder 3"/>
+          <p:cNvSpPr>
+            <a:spLocks noGrp="1" noRot="1" noChangeAspect="1"/>
+          </p:cNvSpPr>
+          <p:nvPr>
+            <p:ph type="sldImg" idx="2"/>
+          </p:nvPr>
+        </p:nvSpPr>
+        <p:spPr>
+          <a:xfrm>
+            <a:off x="685800" y="1143000"/>
+            <a:ext cx="5486400" cy="3086100"/>
+          </a:xfrm>
+          <a:prstGeom prst="rect">
+            <a:avLst/>
+          </a:prstGeom>
+          <a:noFill/>
+          <a:ln w="12700">
+            <a:solidFill>
+              <a:prstClr val="black"/>
+            </a:solidFill>
+          </a:ln>
+        </p:spPr>
+        <p:txBody>
+          <a:bodyPr vert="horz" lIns="91440" tIns="45720" rIns="91440" bIns="45720" rtlCol="0" anchor="ctr"/>
+          <a:lstStyle/>
+          <a:p>
+            <a:endParaRPr lang="en-US"/>
+          </a:p>
+        </p:txBody>
+      </p:sp>
+      <p:sp>
+        <p:nvSpPr>
+          <p:cNvPr id="5" name="Notes Placeholder 4"/>
+          <p:cNvSpPr>
+            <a:spLocks noGrp="1"/>
+          </p:cNvSpPr>
+          <p:nvPr>
+            <p:ph type="body" sz="quarter" idx="3"/>
+          </p:nvPr>
+        </p:nvSpPr>
+        <p:spPr>
+          <a:xfrm>
+            <a:off x="685800" y="4400550"/>
+            <a:ext cx="5486400" cy="3600450"/>
+          </a:xfrm>
+          <a:prstGeom prst="rect">
+            <a:avLst/>
+          </a:prstGeom>
+        </p:spPr>
+        <p:txBody>
+          <a:bodyPr vert="horz" lIns="91440" tIns="45720" rIns="91440" bIns="45720" rtlCol="0"/>
+          <a:lstStyle/>
+          <a:p>
+            <a:pPr lvl="0"/>
+            <a:r>
+              <a:rPr lang="en-US"/>
+              <a:t>Click to edit Master text styles</a:t>
+            </a:r>
+          </a:p>
+          <a:p>
+            <a:pPr lvl="1"/>
+            <a:r>
+              <a:rPr lang="en-US"/>
+              <a:t>Second level</a:t>
+            </a:r>
+          </a:p>
+          <a:p>
+            <a:pPr lvl="2"/>
+            <a:r>
+              <a:rPr lang="en-US"/>
+              <a:t>Third level</a:t>
+            </a:r>
+          </a:p>
+          <a:p>
+            <a:pPr lvl="3"/>
+            <a:r>
+              <a:rPr lang="en-US"/>
+              <a:t>Fourth level</a:t>
+            </a:r>
+          </a:p>
+          <a:p>
+            <a:pPr lvl="4"/>
+            <a:r>
+              <a:rPr lang="en-US"/>
+              <a:t>Fifth level</a:t>
+            </a:r>
+          </a:p>
+        </p:txBody>
+      </p:sp>
+      <p:sp>
+        <p:nvSpPr>
+          <p:cNvPr id="6" name="Footer Placeholder 5"/>
+          <p:cNvSpPr>
+            <a:spLocks noGrp="1"/>
+          </p:cNvSpPr>
+          <p:nvPr>
+            <p:ph type="ftr" sz="quarter" idx="4"/>
+          </p:nvPr>
+        </p:nvSpPr>
+        <p:spPr>
+          <a:xfrm>
+            <a:off x="0" y="8685213"/>
+            <a:ext cx="2971800" cy="458787"/>
+          </a:xfrm>
+          <a:prstGeom prst="rect">
+            <a:avLst/>
+          </a:prstGeom>
+        </p:spPr>
+        <p:txBody>
+          <a:bodyPr vert="horz" lIns="91440" tIns="45720" rIns="91440" bIns="45720" rtlCol="0" anchor="b"/>
+          <a:lstStyle>
+            <a:lvl1pPr algn="l">
+              <a:defRPr sz="1200"/>
+            </a:lvl1pPr>
+          </a:lstStyle>
+          <a:p>
+            <a:endParaRPr lang="en-US"/>
+          </a:p>
+        </p:txBody>
+      </p:sp>
+      <p:sp>
+        <p:nvSpPr>
+          <p:cNvPr id="7" name="Slide Number Placeholder 6"/>
+          <p:cNvSpPr>
+            <a:spLocks noGrp="1"/>
+          </p:cNvSpPr>
+          <p:nvPr>
+            <p:ph type="sldNum" sz="quarter" idx="5"/>
+          </p:nvPr>
+        </p:nvSpPr>
+        <p:spPr>
+          <a:xfrm>
+            <a:off x="3884613" y="8685213"/>
+            <a:ext cx="2971800" cy="458787"/>
+          </a:xfrm>
+          <a:prstGeom prst="rect">
+            <a:avLst/>
+          </a:prstGeom>
+        </p:spPr>
+        <p:txBody>
+          <a:bodyPr vert="horz" lIns="91440" tIns="45720" rIns="91440" bIns="45720" rtlCol="0" anchor="b"/>
+          <a:lstStyle>
+            <a:lvl1pPr algn="r">
+              <a:defRPr sz="1200"/>
+            </a:lvl1pPr>
+          </a:lstStyle>
+          <a:p>
+            <a:fld id="{1B14FDEA-605E-4247-B714-0BAF2FBC82F6}" type="slidenum">
+              <a:rPr lang="en-US" smtClean="0"/>
+              <a:t>‹#›</a:t>
+            </a:fld>
+            <a:endParaRPr lang="en-US"/>
+          </a:p>
+        </p:txBody>
+      </p:sp>
+    </p:spTree>
+    <p:extLst>
+      <p:ext uri="{BB962C8B-B14F-4D97-AF65-F5344CB8AC3E}">
+        <p14:creationId xmlns:p14="http://schemas.microsoft.com/office/powerpoint/2010/main" val="2236617050"/>
+      </p:ext>
+    </p:extLst>
+  </p:cSld>
+  <p:clrMap bg1="lt1" tx1="dk1" bg2="lt2" tx2="dk2" accent1="accent1" accent2="accent2" accent3="accent3" accent4="accent4" accent5="accent5" accent6="accent6" hlink="hlink" folHlink="folHlink"/>
+  <p:notesStyle>
+    <a:lvl1pPr marL="0" algn="l" defTabSz="914400" rtl="0" eaLnBrk="1" latinLnBrk="0" hangingPunct="1">
+      <a:defRPr sz="1200" kern="1200">
+        <a:solidFill>
+          <a:schemeClr val="tx1"/>
+        </a:solidFill>
+        <a:latin typeface="+mn-lt"/>
+        <a:ea typeface="+mn-ea"/>
+        <a:cs typeface="+mn-cs"/>
+      </a:defRPr>
+    </a:lvl1pPr>
+    <a:lvl2pPr marL="457200" algn="l" defTabSz="914400" rtl="0" eaLnBrk="1" latinLnBrk="0" hangingPunct="1">
+      <a:defRPr sz="1200" kern="1200">
+        <a:solidFill>
+          <a:schemeClr val="tx1"/>
+        </a:solidFill>
+        <a:latin typeface="+mn-lt"/>
+        <a:ea typeface="+mn-ea"/>
+        <a:cs typeface="+mn-cs"/>
+      </a:defRPr>
+    </a:lvl2pPr>
+    <a:lvl3pPr marL="914400" algn="l" defTabSz="914400" rtl="0" eaLnBrk="1" latinLnBrk="0" hangingPunct="1">
+      <a:defRPr sz="1200" kern="1200">
+        <a:solidFill>
+          <a:schemeClr val="tx1"/>
+        </a:solidFill>
+        <a:latin typeface="+mn-lt"/>
+        <a:ea typeface="+mn-ea"/>
+        <a:cs typeface="+mn-cs"/>
+      </a:defRPr>
+    </a:lvl3pPr>
+    <a:lvl4pPr marL="1371600" algn="l" defTabSz="914400" rtl="0" eaLnBrk="1" latinLnBrk="0" hangingPunct="1">
+      <a:defRPr sz="1200" kern="1200">
+        <a:solidFill>
+          <a:schemeClr val="tx1"/>
+        </a:solidFill>
+        <a:latin typeface="+mn-lt"/>
+        <a:ea typeface="+mn-ea"/>
+        <a:cs typeface="+mn-cs"/>
+      </a:defRPr>
+    </a:lvl4pPr>
+    <a:lvl5pPr marL="1828800" algn="l" defTabSz="914400" rtl="0" eaLnBrk="1" latinLnBrk="0" hangingPunct="1">
+      <a:defRPr sz="1200" kern="1200">
+        <a:solidFill>
+          <a:schemeClr val="tx1"/>
+        </a:solidFill>
+        <a:latin typeface="+mn-lt"/>
+        <a:ea typeface="+mn-ea"/>
+        <a:cs typeface="+mn-cs"/>
+      </a:defRPr>
+    </a:lvl5pPr>
+    <a:lvl6pPr marL="2286000" algn="l" defTabSz="914400" rtl="0" eaLnBrk="1" latinLnBrk="0" hangingPunct="1">
+      <a:defRPr sz="1200" kern="1200">
+        <a:solidFill>
+          <a:schemeClr val="tx1"/>
+        </a:solidFill>
+        <a:latin typeface="+mn-lt"/>
+        <a:ea typeface="+mn-ea"/>
+        <a:cs typeface="+mn-cs"/>
+      </a:defRPr>
+    </a:lvl6pPr>
+    <a:lvl7pPr marL="2743200" algn="l" defTabSz="914400" rtl="0" eaLnBrk="1" latinLnBrk="0" hangingPunct="1">
+      <a:defRPr sz="1200" kern="1200">
+        <a:solidFill>
+          <a:schemeClr val="tx1"/>
+        </a:solidFill>
+        <a:latin typeface="+mn-lt"/>
+        <a:ea typeface="+mn-ea"/>
+        <a:cs typeface="+mn-cs"/>
+      </a:defRPr>
+    </a:lvl7pPr>
+    <a:lvl8pPr marL="3200400" algn="l" defTabSz="914400" rtl="0" eaLnBrk="1" latinLnBrk="0" hangingPunct="1">
+      <a:defRPr sz="1200" kern="1200">
+        <a:solidFill>
+          <a:schemeClr val="tx1"/>
+        </a:solidFill>
+        <a:latin typeface="+mn-lt"/>
+        <a:ea typeface="+mn-ea"/>
+        <a:cs typeface="+mn-cs"/>
+      </a:defRPr>
+    </a:lvl8pPr>
+    <a:lvl9pPr marL="3657600" algn="l" defTabSz="914400" rtl="0" eaLnBrk="1" latinLnBrk="0" hangingPunct="1">
+      <a:defRPr sz="1200" kern="1200">
+        <a:solidFill>
+          <a:schemeClr val="tx1"/>
+        </a:solidFill>
+        <a:latin typeface="+mn-lt"/>
+        <a:ea typeface="+mn-ea"/>
+        <a:cs typeface="+mn-cs"/>
+      </a:defRPr>
+    </a:lvl9pPr>
+  </p:notesStyle>
+</p:notesMaster>
+</file>
+
+<file path=ppt/notesSlides/notesSlide1.xml><?xml version="1.0" encoding="utf-8"?>
+<p:notes xmlns:a="http://schemas.openxmlformats.org/drawingml/2006/main" xmlns:r="http://schemas.openxmlformats.org/officeDocument/2006/relationships" xmlns:p="http://schemas.openxmlformats.org/presentationml/2006/main" showMasterSp="0" showMasterPhAnim="0">
+  <p:cSld>
+    <p:spTree>
+      <p:nvGrpSpPr>
+        <p:cNvPr id="1" name="Shape 50"/>
+        <p:cNvGrpSpPr/>
+        <p:nvPr/>
+      </p:nvGrpSpPr>
+      <p:grpSpPr>
+        <a:xfrm>
+          <a:off x="0" y="0"/>
+          <a:ext cx="0" cy="0"/>
+          <a:chOff x="0" y="0"/>
+          <a:chExt cx="0" cy="0"/>
+        </a:xfrm>
+      </p:grpSpPr>
+      <p:sp>
+        <p:nvSpPr>
+          <p:cNvPr id="51" name="Google Shape;51;p:notes"/>
+          <p:cNvSpPr>
+            <a:spLocks noGrp="1" noRot="1" noChangeAspect="1"/>
+          </p:cNvSpPr>
+          <p:nvPr>
+            <p:ph type="sldImg" idx="2"/>
+          </p:nvPr>
+        </p:nvSpPr>
+        <p:spPr>
+          <a:xfrm>
+            <a:off x="381300" y="685800"/>
+            <a:ext cx="6096075" cy="3429000"/>
+          </a:xfrm>
+          <a:custGeom>
+            <a:avLst/>
+            <a:gdLst/>
+            <a:ahLst/>
+            <a:cxnLst/>
+            <a:rect l="l" t="t" r="r" b="b"/>
+            <a:pathLst>
+              <a:path w="120000" h="120000" extrusionOk="0">
+                <a:moveTo>
+                  <a:pt x="0" y="0"/>
+                </a:moveTo>
+                <a:lnTo>
+                  <a:pt x="120000" y="0"/>
+                </a:lnTo>
+                <a:lnTo>
+                  <a:pt x="120000" y="120000"/>
+                </a:lnTo>
+                <a:lnTo>
+                  <a:pt x="0" y="120000"/>
+                </a:lnTo>
+                <a:close/>
+              </a:path>
+            </a:pathLst>
+          </a:custGeom>
+        </p:spPr>
+      </p:sp>
+      <p:sp>
+        <p:nvSpPr>
+          <p:cNvPr id="52" name="Google Shape;52;p:notes"/>
+          <p:cNvSpPr txBox="1">
+            <a:spLocks noGrp="1"/>
+          </p:cNvSpPr>
+          <p:nvPr>
+            <p:ph type="body" idx="1"/>
+          </p:nvPr>
+        </p:nvSpPr>
+        <p:spPr>
+          <a:xfrm>
+            <a:off x="685800" y="4343400"/>
+            <a:ext cx="5486400" cy="4114800"/>
+          </a:xfrm>
+          <a:prstGeom prst="rect">
+            <a:avLst/>
+          </a:prstGeom>
+        </p:spPr>
+        <p:txBody>
+          <a:bodyPr spcFirstLastPara="1" wrap="square" lIns="91425" tIns="91425" rIns="91425" bIns="91425" anchor="t" anchorCtr="0">
+            <a:noAutofit/>
+          </a:bodyPr>
+          <a:lstStyle/>
+          <a:p>
+            <a:pPr marL="0" lvl="0" indent="0" algn="l" rtl="0">
+              <a:spcBef>
+                <a:spcPts val="0"/>
+              </a:spcBef>
+              <a:spcAft>
+                <a:spcPts val="0"/>
+              </a:spcAft>
+              <a:buNone/>
+            </a:pPr>
+            <a:endParaRPr/>
+          </a:p>
+        </p:txBody>
+      </p:sp>
+    </p:spTree>
+  </p:cSld>
+  <p:clrMapOvr>
+    <a:masterClrMapping/>
+  </p:clrMapOvr>
+</p:notes>
+</file>
+
+<file path=ppt/notesSlides/notesSlide2.xml><?xml version="1.0" encoding="utf-8"?>
+<p:notes xmlns:a="http://schemas.openxmlformats.org/drawingml/2006/main" xmlns:r="http://schemas.openxmlformats.org/officeDocument/2006/relationships" xmlns:p="http://schemas.openxmlformats.org/presentationml/2006/main" showMasterSp="0" showMasterPhAnim="0">
+  <p:cSld>
+    <p:spTree>
+      <p:nvGrpSpPr>
+        <p:cNvPr id="1" name="Shape 72"/>
+        <p:cNvGrpSpPr/>
+        <p:nvPr/>
+      </p:nvGrpSpPr>
+      <p:grpSpPr>
+        <a:xfrm>
+          <a:off x="0" y="0"/>
+          <a:ext cx="0" cy="0"/>
+          <a:chOff x="0" y="0"/>
+          <a:chExt cx="0" cy="0"/>
+        </a:xfrm>
+      </p:grpSpPr>
+      <p:sp>
+        <p:nvSpPr>
+          <p:cNvPr id="73" name="Google Shape;73;g324b554b733_0_0:notes"/>
+          <p:cNvSpPr>
+            <a:spLocks noGrp="1" noRot="1" noChangeAspect="1"/>
+          </p:cNvSpPr>
+          <p:nvPr>
+            <p:ph type="sldImg" idx="2"/>
+          </p:nvPr>
+        </p:nvSpPr>
+        <p:spPr>
+          <a:xfrm>
+            <a:off x="381300" y="685800"/>
+            <a:ext cx="6096000" cy="3429000"/>
+          </a:xfrm>
+          <a:custGeom>
+            <a:avLst/>
+            <a:gdLst/>
+            <a:ahLst/>
+            <a:cxnLst/>
+            <a:rect l="l" t="t" r="r" b="b"/>
+            <a:pathLst>
+              <a:path w="120000" h="120000" extrusionOk="0">
+                <a:moveTo>
+                  <a:pt x="0" y="0"/>
+                </a:moveTo>
+                <a:lnTo>
+                  <a:pt x="120000" y="0"/>
+                </a:lnTo>
+                <a:lnTo>
+                  <a:pt x="120000" y="120000"/>
+                </a:lnTo>
+                <a:lnTo>
+                  <a:pt x="0" y="120000"/>
+                </a:lnTo>
+                <a:close/>
+              </a:path>
+            </a:pathLst>
+          </a:custGeom>
+        </p:spPr>
+      </p:sp>
+      <p:sp>
+        <p:nvSpPr>
+          <p:cNvPr id="74" name="Google Shape;74;g324b554b733_0_0:notes"/>
+          <p:cNvSpPr txBox="1">
+            <a:spLocks noGrp="1"/>
+          </p:cNvSpPr>
+          <p:nvPr>
+            <p:ph type="body" idx="1"/>
+          </p:nvPr>
+        </p:nvSpPr>
+        <p:spPr>
+          <a:xfrm>
+            <a:off x="685800" y="4343400"/>
+            <a:ext cx="5486400" cy="4114800"/>
+          </a:xfrm>
+          <a:prstGeom prst="rect">
+            <a:avLst/>
+          </a:prstGeom>
+        </p:spPr>
+        <p:txBody>
+          <a:bodyPr spcFirstLastPara="1" wrap="square" lIns="91425" tIns="91425" rIns="91425" bIns="91425" anchor="t" anchorCtr="0">
+            <a:noAutofit/>
+          </a:bodyPr>
+          <a:lstStyle/>
+          <a:p>
+            <a:pPr marL="0" lvl="0" indent="0" algn="l" rtl="0">
+              <a:spcBef>
+                <a:spcPts val="0"/>
+              </a:spcBef>
+              <a:spcAft>
+                <a:spcPts val="0"/>
+              </a:spcAft>
+              <a:buNone/>
+            </a:pPr>
+            <a:endParaRPr/>
+          </a:p>
+        </p:txBody>
+      </p:sp>
+    </p:spTree>
+  </p:cSld>
+  <p:clrMapOvr>
+    <a:masterClrMapping/>
+  </p:clrMapOvr>
+</p:notes>
+</file>
+
 <file path=ppt/slideLayouts/slideLayout1.xml><?xml version="1.0" encoding="utf-8"?>
 <p:sldLayout xmlns:a="http://schemas.openxmlformats.org/drawingml/2006/main" xmlns:r="http://schemas.openxmlformats.org/officeDocument/2006/relationships" xmlns:p="http://schemas.openxmlformats.org/presentationml/2006/main" type="title" preserve="1">
   <p:cSld name="Title Slide">
@@ -258,7 +820,7 @@
           <a:lstStyle/>
           <a:p>
             <a:fld id="{7BCF3E1C-D653-2142-8DF9-5C654E2CC42B}" type="datetimeFigureOut">
-              <a:t>1/5/25</a:t>
+              <a:t>1/13/25</a:t>
             </a:fld>
             <a:endParaRPr lang="en-US"/>
           </a:p>
@@ -454,7 +1016,7 @@
           <a:lstStyle/>
           <a:p>
             <a:fld id="{7BCF3E1C-D653-2142-8DF9-5C654E2CC42B}" type="datetimeFigureOut">
-              <a:t>1/5/25</a:t>
+              <a:t>1/13/25</a:t>
             </a:fld>
             <a:endParaRPr lang="en-US"/>
           </a:p>
@@ -660,7 +1222,7 @@
           <a:lstStyle/>
           <a:p>
             <a:fld id="{7BCF3E1C-D653-2142-8DF9-5C654E2CC42B}" type="datetimeFigureOut">
-              <a:t>1/5/25</a:t>
+              <a:t>1/13/25</a:t>
             </a:fld>
             <a:endParaRPr lang="en-US"/>
           </a:p>
@@ -723,6 +1285,365 @@
     <p:extLst>
       <p:ext uri="{BB962C8B-B14F-4D97-AF65-F5344CB8AC3E}">
         <p14:creationId xmlns:p14="http://schemas.microsoft.com/office/powerpoint/2010/main" val="2188066990"/>
+      </p:ext>
+    </p:extLst>
+  </p:cSld>
+  <p:clrMapOvr>
+    <a:masterClrMapping/>
+  </p:clrMapOvr>
+</p:sldLayout>
+</file>
+
+<file path=ppt/slideLayouts/slideLayout12.xml><?xml version="1.0" encoding="utf-8"?>
+<p:sldLayout xmlns:a="http://schemas.openxmlformats.org/drawingml/2006/main" xmlns:r="http://schemas.openxmlformats.org/officeDocument/2006/relationships" xmlns:p="http://schemas.openxmlformats.org/presentationml/2006/main" matchingName="Title and body" type="tx">
+  <p:cSld name="Title and body">
+    <p:spTree>
+      <p:nvGrpSpPr>
+        <p:cNvPr id="1" name="Shape 16"/>
+        <p:cNvGrpSpPr/>
+        <p:nvPr/>
+      </p:nvGrpSpPr>
+      <p:grpSpPr>
+        <a:xfrm>
+          <a:off x="0" y="0"/>
+          <a:ext cx="0" cy="0"/>
+          <a:chOff x="0" y="0"/>
+          <a:chExt cx="0" cy="0"/>
+        </a:xfrm>
+      </p:grpSpPr>
+      <p:sp>
+        <p:nvSpPr>
+          <p:cNvPr id="17" name="Google Shape;17;p4"/>
+          <p:cNvSpPr txBox="1">
+            <a:spLocks noGrp="1"/>
+          </p:cNvSpPr>
+          <p:nvPr>
+            <p:ph type="title"/>
+          </p:nvPr>
+        </p:nvSpPr>
+        <p:spPr>
+          <a:xfrm>
+            <a:off x="415600" y="593367"/>
+            <a:ext cx="11360800" cy="763600"/>
+          </a:xfrm>
+          <a:prstGeom prst="rect">
+            <a:avLst/>
+          </a:prstGeom>
+        </p:spPr>
+        <p:txBody>
+          <a:bodyPr spcFirstLastPara="1" wrap="square" lIns="91425" tIns="91425" rIns="91425" bIns="91425" anchor="t" anchorCtr="0">
+            <a:normAutofit/>
+          </a:bodyPr>
+          <a:lstStyle>
+            <a:lvl1pPr lvl="0">
+              <a:spcBef>
+                <a:spcPts val="0"/>
+              </a:spcBef>
+              <a:spcAft>
+                <a:spcPts val="0"/>
+              </a:spcAft>
+              <a:buSzPts val="2800"/>
+              <a:buNone/>
+              <a:defRPr/>
+            </a:lvl1pPr>
+            <a:lvl2pPr lvl="1">
+              <a:spcBef>
+                <a:spcPts val="0"/>
+              </a:spcBef>
+              <a:spcAft>
+                <a:spcPts val="0"/>
+              </a:spcAft>
+              <a:buSzPts val="2800"/>
+              <a:buNone/>
+              <a:defRPr/>
+            </a:lvl2pPr>
+            <a:lvl3pPr lvl="2">
+              <a:spcBef>
+                <a:spcPts val="0"/>
+              </a:spcBef>
+              <a:spcAft>
+                <a:spcPts val="0"/>
+              </a:spcAft>
+              <a:buSzPts val="2800"/>
+              <a:buNone/>
+              <a:defRPr/>
+            </a:lvl3pPr>
+            <a:lvl4pPr lvl="3">
+              <a:spcBef>
+                <a:spcPts val="0"/>
+              </a:spcBef>
+              <a:spcAft>
+                <a:spcPts val="0"/>
+              </a:spcAft>
+              <a:buSzPts val="2800"/>
+              <a:buNone/>
+              <a:defRPr/>
+            </a:lvl4pPr>
+            <a:lvl5pPr lvl="4">
+              <a:spcBef>
+                <a:spcPts val="0"/>
+              </a:spcBef>
+              <a:spcAft>
+                <a:spcPts val="0"/>
+              </a:spcAft>
+              <a:buSzPts val="2800"/>
+              <a:buNone/>
+              <a:defRPr/>
+            </a:lvl5pPr>
+            <a:lvl6pPr lvl="5">
+              <a:spcBef>
+                <a:spcPts val="0"/>
+              </a:spcBef>
+              <a:spcAft>
+                <a:spcPts val="0"/>
+              </a:spcAft>
+              <a:buSzPts val="2800"/>
+              <a:buNone/>
+              <a:defRPr/>
+            </a:lvl6pPr>
+            <a:lvl7pPr lvl="6">
+              <a:spcBef>
+                <a:spcPts val="0"/>
+              </a:spcBef>
+              <a:spcAft>
+                <a:spcPts val="0"/>
+              </a:spcAft>
+              <a:buSzPts val="2800"/>
+              <a:buNone/>
+              <a:defRPr/>
+            </a:lvl7pPr>
+            <a:lvl8pPr lvl="7">
+              <a:spcBef>
+                <a:spcPts val="0"/>
+              </a:spcBef>
+              <a:spcAft>
+                <a:spcPts val="0"/>
+              </a:spcAft>
+              <a:buSzPts val="2800"/>
+              <a:buNone/>
+              <a:defRPr/>
+            </a:lvl8pPr>
+            <a:lvl9pPr lvl="8">
+              <a:spcBef>
+                <a:spcPts val="0"/>
+              </a:spcBef>
+              <a:spcAft>
+                <a:spcPts val="0"/>
+              </a:spcAft>
+              <a:buSzPts val="2800"/>
+              <a:buNone/>
+              <a:defRPr/>
+            </a:lvl9pPr>
+          </a:lstStyle>
+          <a:p>
+            <a:endParaRPr/>
+          </a:p>
+        </p:txBody>
+      </p:sp>
+      <p:sp>
+        <p:nvSpPr>
+          <p:cNvPr id="18" name="Google Shape;18;p4"/>
+          <p:cNvSpPr txBox="1">
+            <a:spLocks noGrp="1"/>
+          </p:cNvSpPr>
+          <p:nvPr>
+            <p:ph type="body" idx="1"/>
+          </p:nvPr>
+        </p:nvSpPr>
+        <p:spPr>
+          <a:xfrm>
+            <a:off x="415600" y="1536633"/>
+            <a:ext cx="11360800" cy="4555200"/>
+          </a:xfrm>
+          <a:prstGeom prst="rect">
+            <a:avLst/>
+          </a:prstGeom>
+        </p:spPr>
+        <p:txBody>
+          <a:bodyPr spcFirstLastPara="1" wrap="square" lIns="91425" tIns="91425" rIns="91425" bIns="91425" anchor="t" anchorCtr="0">
+            <a:normAutofit/>
+          </a:bodyPr>
+          <a:lstStyle>
+            <a:lvl1pPr marL="609585" lvl="0" indent="-457189">
+              <a:spcBef>
+                <a:spcPts val="0"/>
+              </a:spcBef>
+              <a:spcAft>
+                <a:spcPts val="0"/>
+              </a:spcAft>
+              <a:buSzPts val="1800"/>
+              <a:buChar char="●"/>
+              <a:defRPr/>
+            </a:lvl1pPr>
+            <a:lvl2pPr marL="1219170" lvl="1" indent="-423323">
+              <a:spcBef>
+                <a:spcPts val="0"/>
+              </a:spcBef>
+              <a:spcAft>
+                <a:spcPts val="0"/>
+              </a:spcAft>
+              <a:buSzPts val="1400"/>
+              <a:buChar char="○"/>
+              <a:defRPr/>
+            </a:lvl2pPr>
+            <a:lvl3pPr marL="1828754" lvl="2" indent="-423323">
+              <a:spcBef>
+                <a:spcPts val="0"/>
+              </a:spcBef>
+              <a:spcAft>
+                <a:spcPts val="0"/>
+              </a:spcAft>
+              <a:buSzPts val="1400"/>
+              <a:buChar char="■"/>
+              <a:defRPr/>
+            </a:lvl3pPr>
+            <a:lvl4pPr marL="2438339" lvl="3" indent="-423323">
+              <a:spcBef>
+                <a:spcPts val="0"/>
+              </a:spcBef>
+              <a:spcAft>
+                <a:spcPts val="0"/>
+              </a:spcAft>
+              <a:buSzPts val="1400"/>
+              <a:buChar char="●"/>
+              <a:defRPr/>
+            </a:lvl4pPr>
+            <a:lvl5pPr marL="3047924" lvl="4" indent="-423323">
+              <a:spcBef>
+                <a:spcPts val="0"/>
+              </a:spcBef>
+              <a:spcAft>
+                <a:spcPts val="0"/>
+              </a:spcAft>
+              <a:buSzPts val="1400"/>
+              <a:buChar char="○"/>
+              <a:defRPr/>
+            </a:lvl5pPr>
+            <a:lvl6pPr marL="3657509" lvl="5" indent="-423323">
+              <a:spcBef>
+                <a:spcPts val="0"/>
+              </a:spcBef>
+              <a:spcAft>
+                <a:spcPts val="0"/>
+              </a:spcAft>
+              <a:buSzPts val="1400"/>
+              <a:buChar char="■"/>
+              <a:defRPr/>
+            </a:lvl6pPr>
+            <a:lvl7pPr marL="4267093" lvl="6" indent="-423323">
+              <a:spcBef>
+                <a:spcPts val="0"/>
+              </a:spcBef>
+              <a:spcAft>
+                <a:spcPts val="0"/>
+              </a:spcAft>
+              <a:buSzPts val="1400"/>
+              <a:buChar char="●"/>
+              <a:defRPr/>
+            </a:lvl7pPr>
+            <a:lvl8pPr marL="4876678" lvl="7" indent="-423323">
+              <a:spcBef>
+                <a:spcPts val="0"/>
+              </a:spcBef>
+              <a:spcAft>
+                <a:spcPts val="0"/>
+              </a:spcAft>
+              <a:buSzPts val="1400"/>
+              <a:buChar char="○"/>
+              <a:defRPr/>
+            </a:lvl8pPr>
+            <a:lvl9pPr marL="5486263" lvl="8" indent="-423323">
+              <a:spcBef>
+                <a:spcPts val="0"/>
+              </a:spcBef>
+              <a:spcAft>
+                <a:spcPts val="0"/>
+              </a:spcAft>
+              <a:buSzPts val="1400"/>
+              <a:buChar char="■"/>
+              <a:defRPr/>
+            </a:lvl9pPr>
+          </a:lstStyle>
+          <a:p>
+            <a:endParaRPr/>
+          </a:p>
+        </p:txBody>
+      </p:sp>
+      <p:sp>
+        <p:nvSpPr>
+          <p:cNvPr id="19" name="Google Shape;19;p4"/>
+          <p:cNvSpPr txBox="1">
+            <a:spLocks noGrp="1"/>
+          </p:cNvSpPr>
+          <p:nvPr>
+            <p:ph type="sldNum" idx="12"/>
+          </p:nvPr>
+        </p:nvSpPr>
+        <p:spPr>
+          <a:xfrm>
+            <a:off x="11296611" y="6217623"/>
+            <a:ext cx="731600" cy="524800"/>
+          </a:xfrm>
+          <a:prstGeom prst="rect">
+            <a:avLst/>
+          </a:prstGeom>
+        </p:spPr>
+        <p:txBody>
+          <a:bodyPr spcFirstLastPara="1" wrap="square" lIns="91425" tIns="91425" rIns="91425" bIns="91425" anchor="ctr" anchorCtr="0">
+            <a:normAutofit/>
+          </a:bodyPr>
+          <a:lstStyle>
+            <a:lvl1pPr lvl="0">
+              <a:buNone/>
+              <a:defRPr/>
+            </a:lvl1pPr>
+            <a:lvl2pPr lvl="1">
+              <a:buNone/>
+              <a:defRPr/>
+            </a:lvl2pPr>
+            <a:lvl3pPr lvl="2">
+              <a:buNone/>
+              <a:defRPr/>
+            </a:lvl3pPr>
+            <a:lvl4pPr lvl="3">
+              <a:buNone/>
+              <a:defRPr/>
+            </a:lvl4pPr>
+            <a:lvl5pPr lvl="4">
+              <a:buNone/>
+              <a:defRPr/>
+            </a:lvl5pPr>
+            <a:lvl6pPr lvl="5">
+              <a:buNone/>
+              <a:defRPr/>
+            </a:lvl6pPr>
+            <a:lvl7pPr lvl="6">
+              <a:buNone/>
+              <a:defRPr/>
+            </a:lvl7pPr>
+            <a:lvl8pPr lvl="7">
+              <a:buNone/>
+              <a:defRPr/>
+            </a:lvl8pPr>
+            <a:lvl9pPr lvl="8">
+              <a:buNone/>
+              <a:defRPr/>
+            </a:lvl9pPr>
+          </a:lstStyle>
+          <a:p>
+            <a:fld id="{00000000-1234-1234-1234-123412341234}" type="slidenum">
+              <a:rPr lang="en-GB" smtClean="0"/>
+              <a:pPr/>
+              <a:t>‹#›</a:t>
+            </a:fld>
+            <a:endParaRPr lang="en-GB"/>
+          </a:p>
+        </p:txBody>
+      </p:sp>
+    </p:spTree>
+    <p:extLst>
+      <p:ext uri="{BB962C8B-B14F-4D97-AF65-F5344CB8AC3E}">
+        <p14:creationId xmlns:p14="http://schemas.microsoft.com/office/powerpoint/2010/main" val="2895174842"/>
       </p:ext>
     </p:extLst>
   </p:cSld>
@@ -856,7 +1777,7 @@
           <a:lstStyle/>
           <a:p>
             <a:fld id="{7BCF3E1C-D653-2142-8DF9-5C654E2CC42B}" type="datetimeFigureOut">
-              <a:t>1/5/25</a:t>
+              <a:t>1/13/25</a:t>
             </a:fld>
             <a:endParaRPr lang="en-US"/>
           </a:p>
@@ -1129,7 +2050,7 @@
           <a:lstStyle/>
           <a:p>
             <a:fld id="{7BCF3E1C-D653-2142-8DF9-5C654E2CC42B}" type="datetimeFigureOut">
-              <a:t>1/5/25</a:t>
+              <a:t>1/13/25</a:t>
             </a:fld>
             <a:endParaRPr lang="en-US"/>
           </a:p>
@@ -1392,7 +2313,7 @@
           <a:lstStyle/>
           <a:p>
             <a:fld id="{7BCF3E1C-D653-2142-8DF9-5C654E2CC42B}" type="datetimeFigureOut">
-              <a:t>1/5/25</a:t>
+              <a:t>1/13/25</a:t>
             </a:fld>
             <a:endParaRPr lang="en-US"/>
           </a:p>
@@ -1802,7 +2723,7 @@
           <a:lstStyle/>
           <a:p>
             <a:fld id="{7BCF3E1C-D653-2142-8DF9-5C654E2CC42B}" type="datetimeFigureOut">
-              <a:t>1/5/25</a:t>
+              <a:t>1/13/25</a:t>
             </a:fld>
             <a:endParaRPr lang="en-US"/>
           </a:p>
@@ -1941,7 +2862,7 @@
           <a:lstStyle/>
           <a:p>
             <a:fld id="{7BCF3E1C-D653-2142-8DF9-5C654E2CC42B}" type="datetimeFigureOut">
-              <a:t>1/5/25</a:t>
+              <a:t>1/13/25</a:t>
             </a:fld>
             <a:endParaRPr lang="en-US"/>
           </a:p>
@@ -2052,7 +2973,7 @@
           <a:lstStyle/>
           <a:p>
             <a:fld id="{7BCF3E1C-D653-2142-8DF9-5C654E2CC42B}" type="datetimeFigureOut">
-              <a:t>1/5/25</a:t>
+              <a:t>1/13/25</a:t>
             </a:fld>
             <a:endParaRPr lang="en-US"/>
           </a:p>
@@ -2361,7 +3282,7 @@
           <a:lstStyle/>
           <a:p>
             <a:fld id="{7BCF3E1C-D653-2142-8DF9-5C654E2CC42B}" type="datetimeFigureOut">
-              <a:t>1/5/25</a:t>
+              <a:t>1/13/25</a:t>
             </a:fld>
             <a:endParaRPr lang="en-US"/>
           </a:p>
@@ -2647,7 +3568,7 @@
           <a:lstStyle/>
           <a:p>
             <a:fld id="{7BCF3E1C-D653-2142-8DF9-5C654E2CC42B}" type="datetimeFigureOut">
-              <a:t>1/5/25</a:t>
+              <a:t>1/13/25</a:t>
             </a:fld>
             <a:endParaRPr lang="en-US"/>
           </a:p>
@@ -2886,7 +3807,7 @@
           </a:lstStyle>
           <a:p>
             <a:fld id="{7BCF3E1C-D653-2142-8DF9-5C654E2CC42B}" type="datetimeFigureOut">
-              <a:t>1/5/25</a:t>
+              <a:t>1/13/25</a:t>
             </a:fld>
             <a:endParaRPr lang="en-US"/>
           </a:p>
@@ -3001,6 +3922,7 @@
     <p:sldLayoutId id="2147483657" r:id="rId9"/>
     <p:sldLayoutId id="2147483658" r:id="rId10"/>
     <p:sldLayoutId id="2147483659" r:id="rId11"/>
+    <p:sldLayoutId id="2147483660" r:id="rId12"/>
   </p:sldLayoutIdLst>
   <p:txStyles>
     <p:titleStyle>
@@ -4077,6 +4999,2957 @@
 </p:sld>
 </file>
 
+<file path=ppt/slides/slide2.xml><?xml version="1.0" encoding="utf-8"?>
+<p:sld xmlns:a="http://schemas.openxmlformats.org/drawingml/2006/main" xmlns:r="http://schemas.openxmlformats.org/officeDocument/2006/relationships" xmlns:p="http://schemas.openxmlformats.org/presentationml/2006/main">
+  <p:cSld>
+    <p:spTree>
+      <p:nvGrpSpPr>
+        <p:cNvPr id="1" name="Shape 53"/>
+        <p:cNvGrpSpPr/>
+        <p:nvPr/>
+      </p:nvGrpSpPr>
+      <p:grpSpPr>
+        <a:xfrm>
+          <a:off x="0" y="0"/>
+          <a:ext cx="0" cy="0"/>
+          <a:chOff x="0" y="0"/>
+          <a:chExt cx="0" cy="0"/>
+        </a:xfrm>
+      </p:grpSpPr>
+      <p:pic>
+        <p:nvPicPr>
+          <p:cNvPr id="54" name="Google Shape;54;p13"/>
+          <p:cNvPicPr preferRelativeResize="0"/>
+          <p:nvPr/>
+        </p:nvPicPr>
+        <p:blipFill>
+          <a:blip r:embed="rId3">
+            <a:alphaModFix/>
+          </a:blip>
+          <a:stretch>
+            <a:fillRect/>
+          </a:stretch>
+        </p:blipFill>
+        <p:spPr>
+          <a:xfrm>
+            <a:off x="89834" y="1949733"/>
+            <a:ext cx="1166333" cy="2871667"/>
+          </a:xfrm>
+          <a:prstGeom prst="rect">
+            <a:avLst/>
+          </a:prstGeom>
+          <a:noFill/>
+          <a:ln>
+            <a:noFill/>
+          </a:ln>
+        </p:spPr>
+      </p:pic>
+      <p:pic>
+        <p:nvPicPr>
+          <p:cNvPr id="55" name="Google Shape;55;p13"/>
+          <p:cNvPicPr preferRelativeResize="0"/>
+          <p:nvPr/>
+        </p:nvPicPr>
+        <p:blipFill>
+          <a:blip r:embed="rId3">
+            <a:alphaModFix/>
+          </a:blip>
+          <a:stretch>
+            <a:fillRect/>
+          </a:stretch>
+        </p:blipFill>
+        <p:spPr>
+          <a:xfrm>
+            <a:off x="1379367" y="1949733"/>
+            <a:ext cx="1166333" cy="2871667"/>
+          </a:xfrm>
+          <a:prstGeom prst="rect">
+            <a:avLst/>
+          </a:prstGeom>
+          <a:noFill/>
+          <a:ln>
+            <a:noFill/>
+          </a:ln>
+        </p:spPr>
+      </p:pic>
+      <p:sp>
+        <p:nvSpPr>
+          <p:cNvPr id="56" name="Google Shape;56;p13"/>
+          <p:cNvSpPr txBox="1"/>
+          <p:nvPr/>
+        </p:nvSpPr>
+        <p:spPr>
+          <a:xfrm>
+            <a:off x="389200" y="2569401"/>
+            <a:ext cx="1086400" cy="1600398"/>
+          </a:xfrm>
+          <a:prstGeom prst="rect">
+            <a:avLst/>
+          </a:prstGeom>
+          <a:noFill/>
+          <a:ln>
+            <a:noFill/>
+          </a:ln>
+        </p:spPr>
+        <p:txBody>
+          <a:bodyPr spcFirstLastPara="1" wrap="square" lIns="121900" tIns="121900" rIns="121900" bIns="121900" anchor="t" anchorCtr="0">
+            <a:spAutoFit/>
+          </a:bodyPr>
+          <a:lstStyle/>
+          <a:p>
+            <a:r>
+              <a:rPr lang="en-GB" sz="2400">
+                <a:solidFill>
+                  <a:schemeClr val="dk2"/>
+                </a:solidFill>
+              </a:rPr>
+              <a:t>X</a:t>
+            </a:r>
+            <a:r>
+              <a:rPr lang="en-GB" sz="1600">
+                <a:solidFill>
+                  <a:schemeClr val="dk2"/>
+                </a:solidFill>
+              </a:rPr>
+              <a:t>1</a:t>
+            </a:r>
+            <a:endParaRPr sz="1600">
+              <a:solidFill>
+                <a:schemeClr val="dk2"/>
+              </a:solidFill>
+            </a:endParaRPr>
+          </a:p>
+          <a:p>
+            <a:r>
+              <a:rPr lang="en-GB" sz="2400">
+                <a:solidFill>
+                  <a:schemeClr val="dk2"/>
+                </a:solidFill>
+              </a:rPr>
+              <a:t>X</a:t>
+            </a:r>
+            <a:r>
+              <a:rPr lang="en-GB" sz="1600">
+                <a:solidFill>
+                  <a:schemeClr val="dk2"/>
+                </a:solidFill>
+              </a:rPr>
+              <a:t>2</a:t>
+            </a:r>
+            <a:endParaRPr sz="1600">
+              <a:solidFill>
+                <a:schemeClr val="dk2"/>
+              </a:solidFill>
+            </a:endParaRPr>
+          </a:p>
+          <a:p>
+            <a:r>
+              <a:rPr lang="en-GB" sz="1600">
+                <a:solidFill>
+                  <a:schemeClr val="dk2"/>
+                </a:solidFill>
+              </a:rPr>
+              <a:t>…</a:t>
+            </a:r>
+            <a:endParaRPr sz="1600">
+              <a:solidFill>
+                <a:schemeClr val="dk2"/>
+              </a:solidFill>
+            </a:endParaRPr>
+          </a:p>
+          <a:p>
+            <a:r>
+              <a:rPr lang="en-GB" sz="2400">
+                <a:solidFill>
+                  <a:schemeClr val="dk2"/>
+                </a:solidFill>
+              </a:rPr>
+              <a:t>X</a:t>
+            </a:r>
+            <a:r>
+              <a:rPr lang="en-GB" sz="1600">
+                <a:solidFill>
+                  <a:schemeClr val="dk2"/>
+                </a:solidFill>
+              </a:rPr>
+              <a:t>d</a:t>
+            </a:r>
+            <a:endParaRPr sz="1600">
+              <a:solidFill>
+                <a:schemeClr val="dk2"/>
+              </a:solidFill>
+            </a:endParaRPr>
+          </a:p>
+        </p:txBody>
+      </p:sp>
+      <p:sp>
+        <p:nvSpPr>
+          <p:cNvPr id="57" name="Google Shape;57;p13"/>
+          <p:cNvSpPr txBox="1"/>
+          <p:nvPr/>
+        </p:nvSpPr>
+        <p:spPr>
+          <a:xfrm>
+            <a:off x="1654967" y="2446201"/>
+            <a:ext cx="652000" cy="1723508"/>
+          </a:xfrm>
+          <a:prstGeom prst="rect">
+            <a:avLst/>
+          </a:prstGeom>
+          <a:noFill/>
+          <a:ln>
+            <a:noFill/>
+          </a:ln>
+        </p:spPr>
+        <p:txBody>
+          <a:bodyPr spcFirstLastPara="1" wrap="square" lIns="121900" tIns="121900" rIns="121900" bIns="121900" anchor="t" anchorCtr="0">
+            <a:spAutoFit/>
+          </a:bodyPr>
+          <a:lstStyle/>
+          <a:p>
+            <a:r>
+              <a:rPr lang="en-GB" sz="2400">
+                <a:solidFill>
+                  <a:schemeClr val="dk2"/>
+                </a:solidFill>
+              </a:rPr>
+              <a:t>W</a:t>
+            </a:r>
+            <a:r>
+              <a:rPr lang="en-GB" sz="1600">
+                <a:solidFill>
+                  <a:schemeClr val="dk2"/>
+                </a:solidFill>
+              </a:rPr>
+              <a:t>1</a:t>
+            </a:r>
+            <a:endParaRPr sz="1600">
+              <a:solidFill>
+                <a:schemeClr val="dk2"/>
+              </a:solidFill>
+            </a:endParaRPr>
+          </a:p>
+          <a:p>
+            <a:r>
+              <a:rPr lang="en-GB" sz="2400">
+                <a:solidFill>
+                  <a:schemeClr val="dk2"/>
+                </a:solidFill>
+              </a:rPr>
+              <a:t>W</a:t>
+            </a:r>
+            <a:r>
+              <a:rPr lang="en-GB" sz="1600">
+                <a:solidFill>
+                  <a:schemeClr val="dk2"/>
+                </a:solidFill>
+              </a:rPr>
+              <a:t>2</a:t>
+            </a:r>
+            <a:br>
+              <a:rPr lang="en-GB" sz="2400">
+                <a:solidFill>
+                  <a:schemeClr val="dk2"/>
+                </a:solidFill>
+              </a:rPr>
+            </a:br>
+            <a:r>
+              <a:rPr lang="en-GB" sz="2400">
+                <a:solidFill>
+                  <a:schemeClr val="dk2"/>
+                </a:solidFill>
+              </a:rPr>
+              <a:t>…</a:t>
+            </a:r>
+            <a:br>
+              <a:rPr lang="en-GB" sz="2400">
+                <a:solidFill>
+                  <a:schemeClr val="dk2"/>
+                </a:solidFill>
+              </a:rPr>
+            </a:br>
+            <a:r>
+              <a:rPr lang="en-GB" sz="2400">
+                <a:solidFill>
+                  <a:schemeClr val="dk2"/>
+                </a:solidFill>
+              </a:rPr>
+              <a:t>W</a:t>
+            </a:r>
+            <a:r>
+              <a:rPr lang="en-GB" sz="1600">
+                <a:solidFill>
+                  <a:schemeClr val="dk2"/>
+                </a:solidFill>
+              </a:rPr>
+              <a:t>d</a:t>
+            </a:r>
+            <a:endParaRPr sz="1600">
+              <a:solidFill>
+                <a:schemeClr val="dk2"/>
+              </a:solidFill>
+            </a:endParaRPr>
+          </a:p>
+        </p:txBody>
+      </p:sp>
+      <p:sp>
+        <p:nvSpPr>
+          <p:cNvPr id="58" name="Google Shape;58;p13"/>
+          <p:cNvSpPr txBox="1"/>
+          <p:nvPr/>
+        </p:nvSpPr>
+        <p:spPr>
+          <a:xfrm>
+            <a:off x="3536733" y="2519385"/>
+            <a:ext cx="5441200" cy="759078"/>
+          </a:xfrm>
+          <a:prstGeom prst="rect">
+            <a:avLst/>
+          </a:prstGeom>
+          <a:noFill/>
+          <a:ln>
+            <a:noFill/>
+          </a:ln>
+        </p:spPr>
+        <p:txBody>
+          <a:bodyPr spcFirstLastPara="1" wrap="square" lIns="121900" tIns="121900" rIns="121900" bIns="121900" anchor="t" anchorCtr="0">
+            <a:spAutoFit/>
+          </a:bodyPr>
+          <a:lstStyle/>
+          <a:p>
+            <a:r>
+              <a:rPr lang="en-GB" sz="2400">
+                <a:solidFill>
+                  <a:schemeClr val="dk2"/>
+                </a:solidFill>
+              </a:rPr>
+              <a:t>X</a:t>
+            </a:r>
+            <a:r>
+              <a:rPr lang="en-GB" sz="3333" b="1">
+                <a:solidFill>
+                  <a:schemeClr val="dk2"/>
+                </a:solidFill>
+              </a:rPr>
+              <a:t>⋅</a:t>
+            </a:r>
+            <a:r>
+              <a:rPr lang="en-GB" sz="2400">
+                <a:solidFill>
+                  <a:schemeClr val="dk2"/>
+                </a:solidFill>
+              </a:rPr>
+              <a:t>W</a:t>
+            </a:r>
+            <a:endParaRPr sz="2400">
+              <a:solidFill>
+                <a:schemeClr val="dk2"/>
+              </a:solidFill>
+            </a:endParaRPr>
+          </a:p>
+        </p:txBody>
+      </p:sp>
+      <p:pic>
+        <p:nvPicPr>
+          <p:cNvPr id="59" name="Google Shape;59;p13"/>
+          <p:cNvPicPr preferRelativeResize="0"/>
+          <p:nvPr/>
+        </p:nvPicPr>
+        <p:blipFill>
+          <a:blip r:embed="rId3">
+            <a:alphaModFix/>
+          </a:blip>
+          <a:stretch>
+            <a:fillRect/>
+          </a:stretch>
+        </p:blipFill>
+        <p:spPr>
+          <a:xfrm>
+            <a:off x="4697967" y="1949733"/>
+            <a:ext cx="1166333" cy="2871667"/>
+          </a:xfrm>
+          <a:prstGeom prst="rect">
+            <a:avLst/>
+          </a:prstGeom>
+          <a:noFill/>
+          <a:ln>
+            <a:noFill/>
+          </a:ln>
+        </p:spPr>
+      </p:pic>
+      <p:pic>
+        <p:nvPicPr>
+          <p:cNvPr id="60" name="Google Shape;60;p13"/>
+          <p:cNvPicPr preferRelativeResize="0"/>
+          <p:nvPr/>
+        </p:nvPicPr>
+        <p:blipFill>
+          <a:blip r:embed="rId3">
+            <a:alphaModFix/>
+          </a:blip>
+          <a:stretch>
+            <a:fillRect/>
+          </a:stretch>
+        </p:blipFill>
+        <p:spPr>
+          <a:xfrm>
+            <a:off x="5987500" y="1949733"/>
+            <a:ext cx="1166333" cy="2871667"/>
+          </a:xfrm>
+          <a:prstGeom prst="rect">
+            <a:avLst/>
+          </a:prstGeom>
+          <a:noFill/>
+          <a:ln>
+            <a:noFill/>
+          </a:ln>
+        </p:spPr>
+      </p:pic>
+      <p:sp>
+        <p:nvSpPr>
+          <p:cNvPr id="61" name="Google Shape;61;p13"/>
+          <p:cNvSpPr txBox="1"/>
+          <p:nvPr/>
+        </p:nvSpPr>
+        <p:spPr>
+          <a:xfrm>
+            <a:off x="4997333" y="2569401"/>
+            <a:ext cx="1086400" cy="1600398"/>
+          </a:xfrm>
+          <a:prstGeom prst="rect">
+            <a:avLst/>
+          </a:prstGeom>
+          <a:noFill/>
+          <a:ln>
+            <a:noFill/>
+          </a:ln>
+        </p:spPr>
+        <p:txBody>
+          <a:bodyPr spcFirstLastPara="1" wrap="square" lIns="121900" tIns="121900" rIns="121900" bIns="121900" anchor="t" anchorCtr="0">
+            <a:spAutoFit/>
+          </a:bodyPr>
+          <a:lstStyle/>
+          <a:p>
+            <a:r>
+              <a:rPr lang="en-GB" sz="2400">
+                <a:solidFill>
+                  <a:schemeClr val="dk2"/>
+                </a:solidFill>
+              </a:rPr>
+              <a:t>X</a:t>
+            </a:r>
+            <a:r>
+              <a:rPr lang="en-GB" sz="1600">
+                <a:solidFill>
+                  <a:schemeClr val="dk2"/>
+                </a:solidFill>
+              </a:rPr>
+              <a:t>1</a:t>
+            </a:r>
+            <a:endParaRPr sz="1600">
+              <a:solidFill>
+                <a:schemeClr val="dk2"/>
+              </a:solidFill>
+            </a:endParaRPr>
+          </a:p>
+          <a:p>
+            <a:r>
+              <a:rPr lang="en-GB" sz="2400">
+                <a:solidFill>
+                  <a:schemeClr val="dk2"/>
+                </a:solidFill>
+              </a:rPr>
+              <a:t>X</a:t>
+            </a:r>
+            <a:r>
+              <a:rPr lang="en-GB" sz="1600">
+                <a:solidFill>
+                  <a:schemeClr val="dk2"/>
+                </a:solidFill>
+              </a:rPr>
+              <a:t>2</a:t>
+            </a:r>
+            <a:endParaRPr sz="1600">
+              <a:solidFill>
+                <a:schemeClr val="dk2"/>
+              </a:solidFill>
+            </a:endParaRPr>
+          </a:p>
+          <a:p>
+            <a:r>
+              <a:rPr lang="en-GB" sz="1600">
+                <a:solidFill>
+                  <a:schemeClr val="dk2"/>
+                </a:solidFill>
+              </a:rPr>
+              <a:t>…</a:t>
+            </a:r>
+            <a:endParaRPr sz="1600">
+              <a:solidFill>
+                <a:schemeClr val="dk2"/>
+              </a:solidFill>
+            </a:endParaRPr>
+          </a:p>
+          <a:p>
+            <a:r>
+              <a:rPr lang="en-GB" sz="2400">
+                <a:solidFill>
+                  <a:schemeClr val="dk2"/>
+                </a:solidFill>
+              </a:rPr>
+              <a:t>X</a:t>
+            </a:r>
+            <a:r>
+              <a:rPr lang="en-GB" sz="1600">
+                <a:solidFill>
+                  <a:schemeClr val="dk2"/>
+                </a:solidFill>
+              </a:rPr>
+              <a:t>d</a:t>
+            </a:r>
+            <a:endParaRPr sz="1600">
+              <a:solidFill>
+                <a:schemeClr val="dk2"/>
+              </a:solidFill>
+            </a:endParaRPr>
+          </a:p>
+        </p:txBody>
+      </p:sp>
+      <p:sp>
+        <p:nvSpPr>
+          <p:cNvPr id="62" name="Google Shape;62;p13"/>
+          <p:cNvSpPr txBox="1"/>
+          <p:nvPr/>
+        </p:nvSpPr>
+        <p:spPr>
+          <a:xfrm>
+            <a:off x="6263100" y="2446201"/>
+            <a:ext cx="652000" cy="1723508"/>
+          </a:xfrm>
+          <a:prstGeom prst="rect">
+            <a:avLst/>
+          </a:prstGeom>
+          <a:noFill/>
+          <a:ln>
+            <a:noFill/>
+          </a:ln>
+        </p:spPr>
+        <p:txBody>
+          <a:bodyPr spcFirstLastPara="1" wrap="square" lIns="121900" tIns="121900" rIns="121900" bIns="121900" anchor="t" anchorCtr="0">
+            <a:spAutoFit/>
+          </a:bodyPr>
+          <a:lstStyle/>
+          <a:p>
+            <a:r>
+              <a:rPr lang="en-GB" sz="2400">
+                <a:solidFill>
+                  <a:schemeClr val="dk2"/>
+                </a:solidFill>
+              </a:rPr>
+              <a:t>W</a:t>
+            </a:r>
+            <a:r>
+              <a:rPr lang="en-GB" sz="1600">
+                <a:solidFill>
+                  <a:schemeClr val="dk2"/>
+                </a:solidFill>
+              </a:rPr>
+              <a:t>1</a:t>
+            </a:r>
+            <a:endParaRPr sz="1600">
+              <a:solidFill>
+                <a:schemeClr val="dk2"/>
+              </a:solidFill>
+            </a:endParaRPr>
+          </a:p>
+          <a:p>
+            <a:r>
+              <a:rPr lang="en-GB" sz="2400">
+                <a:solidFill>
+                  <a:schemeClr val="dk2"/>
+                </a:solidFill>
+              </a:rPr>
+              <a:t>W</a:t>
+            </a:r>
+            <a:r>
+              <a:rPr lang="en-GB" sz="1600">
+                <a:solidFill>
+                  <a:schemeClr val="dk2"/>
+                </a:solidFill>
+              </a:rPr>
+              <a:t>2</a:t>
+            </a:r>
+            <a:br>
+              <a:rPr lang="en-GB" sz="2400">
+                <a:solidFill>
+                  <a:schemeClr val="dk2"/>
+                </a:solidFill>
+              </a:rPr>
+            </a:br>
+            <a:r>
+              <a:rPr lang="en-GB" sz="2400">
+                <a:solidFill>
+                  <a:schemeClr val="dk2"/>
+                </a:solidFill>
+              </a:rPr>
+              <a:t>…</a:t>
+            </a:r>
+            <a:br>
+              <a:rPr lang="en-GB" sz="2400">
+                <a:solidFill>
+                  <a:schemeClr val="dk2"/>
+                </a:solidFill>
+              </a:rPr>
+            </a:br>
+            <a:r>
+              <a:rPr lang="en-GB" sz="2400">
+                <a:solidFill>
+                  <a:schemeClr val="dk2"/>
+                </a:solidFill>
+              </a:rPr>
+              <a:t>W</a:t>
+            </a:r>
+            <a:r>
+              <a:rPr lang="en-GB" sz="1600">
+                <a:solidFill>
+                  <a:schemeClr val="dk2"/>
+                </a:solidFill>
+              </a:rPr>
+              <a:t>d</a:t>
+            </a:r>
+            <a:endParaRPr sz="1600">
+              <a:solidFill>
+                <a:schemeClr val="dk2"/>
+              </a:solidFill>
+            </a:endParaRPr>
+          </a:p>
+        </p:txBody>
+      </p:sp>
+      <p:sp>
+        <p:nvSpPr>
+          <p:cNvPr id="63" name="Google Shape;63;p13"/>
+          <p:cNvSpPr txBox="1"/>
+          <p:nvPr/>
+        </p:nvSpPr>
+        <p:spPr>
+          <a:xfrm>
+            <a:off x="8144867" y="2519385"/>
+            <a:ext cx="5441200" cy="759078"/>
+          </a:xfrm>
+          <a:prstGeom prst="rect">
+            <a:avLst/>
+          </a:prstGeom>
+          <a:noFill/>
+          <a:ln>
+            <a:noFill/>
+          </a:ln>
+        </p:spPr>
+        <p:txBody>
+          <a:bodyPr spcFirstLastPara="1" wrap="square" lIns="121900" tIns="121900" rIns="121900" bIns="121900" anchor="t" anchorCtr="0">
+            <a:spAutoFit/>
+          </a:bodyPr>
+          <a:lstStyle/>
+          <a:p>
+            <a:r>
+              <a:rPr lang="en-GB" sz="2400">
+                <a:solidFill>
+                  <a:schemeClr val="dk2"/>
+                </a:solidFill>
+              </a:rPr>
+              <a:t>X</a:t>
+            </a:r>
+            <a:r>
+              <a:rPr lang="en-GB" sz="3333" b="1">
+                <a:solidFill>
+                  <a:schemeClr val="dk2"/>
+                </a:solidFill>
+              </a:rPr>
+              <a:t>⋅</a:t>
+            </a:r>
+            <a:r>
+              <a:rPr lang="en-GB" sz="2400">
+                <a:solidFill>
+                  <a:schemeClr val="dk2"/>
+                </a:solidFill>
+              </a:rPr>
+              <a:t>W</a:t>
+            </a:r>
+            <a:endParaRPr sz="2400">
+              <a:solidFill>
+                <a:schemeClr val="dk2"/>
+              </a:solidFill>
+            </a:endParaRPr>
+          </a:p>
+        </p:txBody>
+      </p:sp>
+      <p:sp>
+        <p:nvSpPr>
+          <p:cNvPr id="64" name="Google Shape;64;p13"/>
+          <p:cNvSpPr txBox="1"/>
+          <p:nvPr/>
+        </p:nvSpPr>
+        <p:spPr>
+          <a:xfrm>
+            <a:off x="8255300" y="1949733"/>
+            <a:ext cx="4000000" cy="615513"/>
+          </a:xfrm>
+          <a:prstGeom prst="rect">
+            <a:avLst/>
+          </a:prstGeom>
+          <a:noFill/>
+          <a:ln>
+            <a:noFill/>
+          </a:ln>
+        </p:spPr>
+        <p:txBody>
+          <a:bodyPr spcFirstLastPara="1" wrap="square" lIns="121900" tIns="121900" rIns="121900" bIns="121900" anchor="t" anchorCtr="0">
+            <a:spAutoFit/>
+          </a:bodyPr>
+          <a:lstStyle/>
+          <a:p>
+            <a:r>
+              <a:rPr lang="en-GB" sz="2400" b="1"/>
+              <a:t>∈ R</a:t>
+            </a:r>
+            <a:endParaRPr sz="2400" b="1"/>
+          </a:p>
+        </p:txBody>
+      </p:sp>
+      <p:cxnSp>
+        <p:nvCxnSpPr>
+          <p:cNvPr id="65" name="Google Shape;65;p13"/>
+          <p:cNvCxnSpPr>
+            <a:endCxn id="58" idx="1"/>
+          </p:cNvCxnSpPr>
+          <p:nvPr/>
+        </p:nvCxnSpPr>
+        <p:spPr>
+          <a:xfrm>
+            <a:off x="2661933" y="2894185"/>
+            <a:ext cx="874800" cy="4739"/>
+          </a:xfrm>
+          <a:prstGeom prst="straightConnector1">
+            <a:avLst/>
+          </a:prstGeom>
+          <a:noFill/>
+          <a:ln w="9525" cap="flat" cmpd="sng">
+            <a:solidFill>
+              <a:schemeClr val="dk2"/>
+            </a:solidFill>
+            <a:prstDash val="solid"/>
+            <a:round/>
+            <a:headEnd type="none" w="med" len="med"/>
+            <a:tailEnd type="triangle" w="med" len="med"/>
+          </a:ln>
+        </p:spPr>
+      </p:cxnSp>
+      <p:cxnSp>
+        <p:nvCxnSpPr>
+          <p:cNvPr id="66" name="Google Shape;66;p13"/>
+          <p:cNvCxnSpPr/>
+          <p:nvPr/>
+        </p:nvCxnSpPr>
+        <p:spPr>
+          <a:xfrm>
+            <a:off x="7153833" y="2896600"/>
+            <a:ext cx="874800" cy="4800"/>
+          </a:xfrm>
+          <a:prstGeom prst="straightConnector1">
+            <a:avLst/>
+          </a:prstGeom>
+          <a:noFill/>
+          <a:ln w="9525" cap="flat" cmpd="sng">
+            <a:solidFill>
+              <a:schemeClr val="dk2"/>
+            </a:solidFill>
+            <a:prstDash val="solid"/>
+            <a:round/>
+            <a:headEnd type="none" w="med" len="med"/>
+            <a:tailEnd type="triangle" w="med" len="med"/>
+          </a:ln>
+        </p:spPr>
+      </p:cxnSp>
+      <p:cxnSp>
+        <p:nvCxnSpPr>
+          <p:cNvPr id="67" name="Google Shape;67;p13"/>
+          <p:cNvCxnSpPr/>
+          <p:nvPr/>
+        </p:nvCxnSpPr>
+        <p:spPr>
+          <a:xfrm>
+            <a:off x="9086667" y="2896600"/>
+            <a:ext cx="874800" cy="4800"/>
+          </a:xfrm>
+          <a:prstGeom prst="straightConnector1">
+            <a:avLst/>
+          </a:prstGeom>
+          <a:noFill/>
+          <a:ln w="9525" cap="flat" cmpd="sng">
+            <a:solidFill>
+              <a:schemeClr val="dk2"/>
+            </a:solidFill>
+            <a:prstDash val="solid"/>
+            <a:round/>
+            <a:headEnd type="none" w="med" len="med"/>
+            <a:tailEnd type="triangle" w="med" len="med"/>
+          </a:ln>
+        </p:spPr>
+      </p:cxnSp>
+      <p:cxnSp>
+        <p:nvCxnSpPr>
+          <p:cNvPr id="68" name="Google Shape;68;p13"/>
+          <p:cNvCxnSpPr/>
+          <p:nvPr/>
+        </p:nvCxnSpPr>
+        <p:spPr>
+          <a:xfrm>
+            <a:off x="8556433" y="2403133"/>
+            <a:ext cx="0" cy="340000"/>
+          </a:xfrm>
+          <a:prstGeom prst="straightConnector1">
+            <a:avLst/>
+          </a:prstGeom>
+          <a:noFill/>
+          <a:ln w="9525" cap="flat" cmpd="sng">
+            <a:solidFill>
+              <a:schemeClr val="dk2"/>
+            </a:solidFill>
+            <a:prstDash val="solid"/>
+            <a:round/>
+            <a:headEnd type="none" w="med" len="med"/>
+            <a:tailEnd type="none" w="med" len="med"/>
+          </a:ln>
+        </p:spPr>
+      </p:cxnSp>
+      <p:sp>
+        <p:nvSpPr>
+          <p:cNvPr id="69" name="Google Shape;69;p13"/>
+          <p:cNvSpPr txBox="1"/>
+          <p:nvPr/>
+        </p:nvSpPr>
+        <p:spPr>
+          <a:xfrm>
+            <a:off x="9238467" y="2306333"/>
+            <a:ext cx="4000000" cy="615513"/>
+          </a:xfrm>
+          <a:prstGeom prst="rect">
+            <a:avLst/>
+          </a:prstGeom>
+          <a:noFill/>
+          <a:ln>
+            <a:noFill/>
+          </a:ln>
+        </p:spPr>
+        <p:txBody>
+          <a:bodyPr spcFirstLastPara="1" wrap="square" lIns="121900" tIns="121900" rIns="121900" bIns="121900" anchor="t" anchorCtr="0">
+            <a:spAutoFit/>
+          </a:bodyPr>
+          <a:lstStyle/>
+          <a:p>
+            <a:r>
+              <a:rPr lang="en-GB" sz="2400"/>
+              <a:t>σ</a:t>
+            </a:r>
+            <a:endParaRPr sz="2400"/>
+          </a:p>
+        </p:txBody>
+      </p:sp>
+      <p:sp>
+        <p:nvSpPr>
+          <p:cNvPr id="70" name="Google Shape;70;p13"/>
+          <p:cNvSpPr txBox="1"/>
+          <p:nvPr/>
+        </p:nvSpPr>
+        <p:spPr>
+          <a:xfrm>
+            <a:off x="9968967" y="2569400"/>
+            <a:ext cx="4000000" cy="615513"/>
+          </a:xfrm>
+          <a:prstGeom prst="rect">
+            <a:avLst/>
+          </a:prstGeom>
+          <a:noFill/>
+          <a:ln>
+            <a:noFill/>
+          </a:ln>
+        </p:spPr>
+        <p:txBody>
+          <a:bodyPr spcFirstLastPara="1" wrap="square" lIns="121900" tIns="121900" rIns="121900" bIns="121900" anchor="t" anchorCtr="0">
+            <a:spAutoFit/>
+          </a:bodyPr>
+          <a:lstStyle/>
+          <a:p>
+            <a:r>
+              <a:rPr lang="en-GB" sz="2400"/>
+              <a:t>x ∈ [0,1]</a:t>
+            </a:r>
+            <a:endParaRPr sz="2400"/>
+          </a:p>
+        </p:txBody>
+      </p:sp>
+      <p:sp>
+        <p:nvSpPr>
+          <p:cNvPr id="71" name="Google Shape;71;p13"/>
+          <p:cNvSpPr txBox="1"/>
+          <p:nvPr/>
+        </p:nvSpPr>
+        <p:spPr>
+          <a:xfrm>
+            <a:off x="275833" y="1458567"/>
+            <a:ext cx="11492400" cy="615513"/>
+          </a:xfrm>
+          <a:prstGeom prst="rect">
+            <a:avLst/>
+          </a:prstGeom>
+          <a:noFill/>
+          <a:ln>
+            <a:noFill/>
+          </a:ln>
+        </p:spPr>
+        <p:txBody>
+          <a:bodyPr spcFirstLastPara="1" wrap="square" lIns="121900" tIns="121900" rIns="121900" bIns="121900" anchor="t" anchorCtr="0">
+            <a:spAutoFit/>
+          </a:bodyPr>
+          <a:lstStyle/>
+          <a:p>
+            <a:r>
+              <a:rPr lang="en-GB" sz="2400" b="1">
+                <a:solidFill>
+                  <a:schemeClr val="dk1"/>
+                </a:solidFill>
+              </a:rPr>
+              <a:t>Linear Regression  </a:t>
+            </a:r>
+            <a:r>
+              <a:rPr lang="en-GB" sz="2400" b="1">
+                <a:solidFill>
+                  <a:schemeClr val="dk2"/>
+                </a:solidFill>
+              </a:rPr>
+              <a:t>                        </a:t>
+            </a:r>
+            <a:r>
+              <a:rPr lang="en-GB" sz="2400" b="1">
+                <a:solidFill>
+                  <a:schemeClr val="dk1"/>
+                </a:solidFill>
+              </a:rPr>
+              <a:t>Logistic Regression</a:t>
+            </a:r>
+            <a:endParaRPr sz="2400" b="1">
+              <a:solidFill>
+                <a:schemeClr val="dk1"/>
+              </a:solidFill>
+            </a:endParaRPr>
+          </a:p>
+        </p:txBody>
+      </p:sp>
+    </p:spTree>
+  </p:cSld>
+  <p:clrMapOvr>
+    <a:masterClrMapping/>
+  </p:clrMapOvr>
+</p:sld>
+</file>
+
+<file path=ppt/slides/slide3.xml><?xml version="1.0" encoding="utf-8"?>
+<p:sld xmlns:a="http://schemas.openxmlformats.org/drawingml/2006/main" xmlns:r="http://schemas.openxmlformats.org/officeDocument/2006/relationships" xmlns:p="http://schemas.openxmlformats.org/presentationml/2006/main">
+  <p:cSld>
+    <p:spTree>
+      <p:nvGrpSpPr>
+        <p:cNvPr id="1" name="Shape 75"/>
+        <p:cNvGrpSpPr/>
+        <p:nvPr/>
+      </p:nvGrpSpPr>
+      <p:grpSpPr>
+        <a:xfrm>
+          <a:off x="0" y="0"/>
+          <a:ext cx="0" cy="0"/>
+          <a:chOff x="0" y="0"/>
+          <a:chExt cx="0" cy="0"/>
+        </a:xfrm>
+      </p:grpSpPr>
+      <p:sp>
+        <p:nvSpPr>
+          <p:cNvPr id="76" name="Google Shape;76;p14"/>
+          <p:cNvSpPr/>
+          <p:nvPr/>
+        </p:nvSpPr>
+        <p:spPr>
+          <a:xfrm>
+            <a:off x="641700" y="599100"/>
+            <a:ext cx="812400" cy="831200"/>
+          </a:xfrm>
+          <a:prstGeom prst="ellipse">
+            <a:avLst/>
+          </a:prstGeom>
+          <a:solidFill>
+            <a:srgbClr val="8E7CC3"/>
+          </a:solidFill>
+          <a:ln w="9525" cap="flat" cmpd="sng">
+            <a:solidFill>
+              <a:schemeClr val="dk2"/>
+            </a:solidFill>
+            <a:prstDash val="solid"/>
+            <a:round/>
+            <a:headEnd type="none" w="sm" len="sm"/>
+            <a:tailEnd type="none" w="sm" len="sm"/>
+          </a:ln>
+        </p:spPr>
+        <p:txBody>
+          <a:bodyPr spcFirstLastPara="1" wrap="square" lIns="121900" tIns="121900" rIns="121900" bIns="121900" anchor="ctr" anchorCtr="0">
+            <a:noAutofit/>
+          </a:bodyPr>
+          <a:lstStyle/>
+          <a:p>
+            <a:pPr algn="ctr"/>
+            <a:endParaRPr sz="2400">
+              <a:solidFill>
+                <a:schemeClr val="dk1"/>
+              </a:solidFill>
+              <a:highlight>
+                <a:schemeClr val="dk1"/>
+              </a:highlight>
+            </a:endParaRPr>
+          </a:p>
+        </p:txBody>
+      </p:sp>
+      <p:sp>
+        <p:nvSpPr>
+          <p:cNvPr id="77" name="Google Shape;77;p14"/>
+          <p:cNvSpPr/>
+          <p:nvPr/>
+        </p:nvSpPr>
+        <p:spPr>
+          <a:xfrm>
+            <a:off x="641700" y="2120067"/>
+            <a:ext cx="812400" cy="831200"/>
+          </a:xfrm>
+          <a:prstGeom prst="ellipse">
+            <a:avLst/>
+          </a:prstGeom>
+          <a:solidFill>
+            <a:srgbClr val="8E7CC3"/>
+          </a:solidFill>
+          <a:ln w="9525" cap="flat" cmpd="sng">
+            <a:solidFill>
+              <a:schemeClr val="dk2"/>
+            </a:solidFill>
+            <a:prstDash val="solid"/>
+            <a:round/>
+            <a:headEnd type="none" w="sm" len="sm"/>
+            <a:tailEnd type="none" w="sm" len="sm"/>
+          </a:ln>
+        </p:spPr>
+        <p:txBody>
+          <a:bodyPr spcFirstLastPara="1" wrap="square" lIns="121900" tIns="121900" rIns="121900" bIns="121900" anchor="ctr" anchorCtr="0">
+            <a:noAutofit/>
+          </a:bodyPr>
+          <a:lstStyle/>
+          <a:p>
+            <a:pPr algn="ctr"/>
+            <a:endParaRPr sz="2400">
+              <a:solidFill>
+                <a:schemeClr val="dk1"/>
+              </a:solidFill>
+              <a:highlight>
+                <a:schemeClr val="dk1"/>
+              </a:highlight>
+            </a:endParaRPr>
+          </a:p>
+        </p:txBody>
+      </p:sp>
+      <p:sp>
+        <p:nvSpPr>
+          <p:cNvPr id="78" name="Google Shape;78;p14"/>
+          <p:cNvSpPr/>
+          <p:nvPr/>
+        </p:nvSpPr>
+        <p:spPr>
+          <a:xfrm>
+            <a:off x="641700" y="3641033"/>
+            <a:ext cx="812400" cy="831200"/>
+          </a:xfrm>
+          <a:prstGeom prst="ellipse">
+            <a:avLst/>
+          </a:prstGeom>
+          <a:solidFill>
+            <a:srgbClr val="8E7CC3"/>
+          </a:solidFill>
+          <a:ln w="9525" cap="flat" cmpd="sng">
+            <a:solidFill>
+              <a:schemeClr val="dk2"/>
+            </a:solidFill>
+            <a:prstDash val="solid"/>
+            <a:round/>
+            <a:headEnd type="none" w="sm" len="sm"/>
+            <a:tailEnd type="none" w="sm" len="sm"/>
+          </a:ln>
+        </p:spPr>
+        <p:txBody>
+          <a:bodyPr spcFirstLastPara="1" wrap="square" lIns="121900" tIns="121900" rIns="121900" bIns="121900" anchor="ctr" anchorCtr="0">
+            <a:noAutofit/>
+          </a:bodyPr>
+          <a:lstStyle/>
+          <a:p>
+            <a:pPr algn="ctr"/>
+            <a:endParaRPr sz="2400">
+              <a:solidFill>
+                <a:schemeClr val="dk1"/>
+              </a:solidFill>
+              <a:highlight>
+                <a:schemeClr val="dk1"/>
+              </a:highlight>
+            </a:endParaRPr>
+          </a:p>
+        </p:txBody>
+      </p:sp>
+      <p:sp>
+        <p:nvSpPr>
+          <p:cNvPr id="79" name="Google Shape;79;p14"/>
+          <p:cNvSpPr/>
+          <p:nvPr/>
+        </p:nvSpPr>
+        <p:spPr>
+          <a:xfrm>
+            <a:off x="641700" y="5931833"/>
+            <a:ext cx="812400" cy="831200"/>
+          </a:xfrm>
+          <a:prstGeom prst="ellipse">
+            <a:avLst/>
+          </a:prstGeom>
+          <a:solidFill>
+            <a:srgbClr val="8E7CC3"/>
+          </a:solidFill>
+          <a:ln w="9525" cap="flat" cmpd="sng">
+            <a:solidFill>
+              <a:schemeClr val="dk2"/>
+            </a:solidFill>
+            <a:prstDash val="solid"/>
+            <a:round/>
+            <a:headEnd type="none" w="sm" len="sm"/>
+            <a:tailEnd type="none" w="sm" len="sm"/>
+          </a:ln>
+        </p:spPr>
+        <p:txBody>
+          <a:bodyPr spcFirstLastPara="1" wrap="square" lIns="121900" tIns="121900" rIns="121900" bIns="121900" anchor="ctr" anchorCtr="0">
+            <a:noAutofit/>
+          </a:bodyPr>
+          <a:lstStyle/>
+          <a:p>
+            <a:pPr algn="ctr"/>
+            <a:endParaRPr sz="2400">
+              <a:solidFill>
+                <a:schemeClr val="dk1"/>
+              </a:solidFill>
+              <a:highlight>
+                <a:schemeClr val="dk1"/>
+              </a:highlight>
+            </a:endParaRPr>
+          </a:p>
+        </p:txBody>
+      </p:sp>
+      <p:sp>
+        <p:nvSpPr>
+          <p:cNvPr id="80" name="Google Shape;80;p14"/>
+          <p:cNvSpPr txBox="1"/>
+          <p:nvPr/>
+        </p:nvSpPr>
+        <p:spPr>
+          <a:xfrm>
+            <a:off x="849533" y="4415401"/>
+            <a:ext cx="746400" cy="1354176"/>
+          </a:xfrm>
+          <a:prstGeom prst="rect">
+            <a:avLst/>
+          </a:prstGeom>
+          <a:noFill/>
+          <a:ln>
+            <a:noFill/>
+          </a:ln>
+        </p:spPr>
+        <p:txBody>
+          <a:bodyPr spcFirstLastPara="1" wrap="square" lIns="121900" tIns="121900" rIns="121900" bIns="121900" anchor="t" anchorCtr="0">
+            <a:spAutoFit/>
+          </a:bodyPr>
+          <a:lstStyle/>
+          <a:p>
+            <a:r>
+              <a:rPr lang="en-GB" sz="2400" b="1">
+                <a:solidFill>
+                  <a:schemeClr val="dk1"/>
+                </a:solidFill>
+              </a:rPr>
+              <a:t>.</a:t>
+            </a:r>
+            <a:endParaRPr sz="2400" b="1">
+              <a:solidFill>
+                <a:schemeClr val="dk1"/>
+              </a:solidFill>
+            </a:endParaRPr>
+          </a:p>
+          <a:p>
+            <a:r>
+              <a:rPr lang="en-GB" sz="2400" b="1">
+                <a:solidFill>
+                  <a:schemeClr val="dk1"/>
+                </a:solidFill>
+              </a:rPr>
+              <a:t>.</a:t>
+            </a:r>
+            <a:endParaRPr sz="2400" b="1">
+              <a:solidFill>
+                <a:schemeClr val="dk1"/>
+              </a:solidFill>
+            </a:endParaRPr>
+          </a:p>
+          <a:p>
+            <a:r>
+              <a:rPr lang="en-GB" sz="2400" b="1">
+                <a:solidFill>
+                  <a:schemeClr val="dk1"/>
+                </a:solidFill>
+              </a:rPr>
+              <a:t>.</a:t>
+            </a:r>
+            <a:endParaRPr sz="2400" b="1">
+              <a:solidFill>
+                <a:schemeClr val="dk1"/>
+              </a:solidFill>
+            </a:endParaRPr>
+          </a:p>
+        </p:txBody>
+      </p:sp>
+      <p:sp>
+        <p:nvSpPr>
+          <p:cNvPr id="81" name="Google Shape;81;p14"/>
+          <p:cNvSpPr txBox="1"/>
+          <p:nvPr/>
+        </p:nvSpPr>
+        <p:spPr>
+          <a:xfrm>
+            <a:off x="750367" y="665900"/>
+            <a:ext cx="5498000" cy="697523"/>
+          </a:xfrm>
+          <a:prstGeom prst="rect">
+            <a:avLst/>
+          </a:prstGeom>
+          <a:noFill/>
+          <a:ln>
+            <a:noFill/>
+          </a:ln>
+        </p:spPr>
+        <p:txBody>
+          <a:bodyPr spcFirstLastPara="1" wrap="square" lIns="121900" tIns="121900" rIns="121900" bIns="121900" anchor="t" anchorCtr="0">
+            <a:spAutoFit/>
+          </a:bodyPr>
+          <a:lstStyle/>
+          <a:p>
+            <a:r>
+              <a:rPr lang="en-GB" sz="2933">
+                <a:solidFill>
+                  <a:schemeClr val="dk1"/>
+                </a:solidFill>
+              </a:rPr>
+              <a:t>X</a:t>
+            </a:r>
+            <a:r>
+              <a:rPr lang="en-GB" sz="2000">
+                <a:solidFill>
+                  <a:schemeClr val="dk1"/>
+                </a:solidFill>
+              </a:rPr>
+              <a:t>1</a:t>
+            </a:r>
+            <a:endParaRPr sz="2000">
+              <a:solidFill>
+                <a:schemeClr val="dk1"/>
+              </a:solidFill>
+            </a:endParaRPr>
+          </a:p>
+        </p:txBody>
+      </p:sp>
+      <p:sp>
+        <p:nvSpPr>
+          <p:cNvPr id="82" name="Google Shape;82;p14"/>
+          <p:cNvSpPr txBox="1"/>
+          <p:nvPr/>
+        </p:nvSpPr>
+        <p:spPr>
+          <a:xfrm>
+            <a:off x="750367" y="2153467"/>
+            <a:ext cx="5498000" cy="697523"/>
+          </a:xfrm>
+          <a:prstGeom prst="rect">
+            <a:avLst/>
+          </a:prstGeom>
+          <a:noFill/>
+          <a:ln>
+            <a:noFill/>
+          </a:ln>
+        </p:spPr>
+        <p:txBody>
+          <a:bodyPr spcFirstLastPara="1" wrap="square" lIns="121900" tIns="121900" rIns="121900" bIns="121900" anchor="t" anchorCtr="0">
+            <a:spAutoFit/>
+          </a:bodyPr>
+          <a:lstStyle/>
+          <a:p>
+            <a:r>
+              <a:rPr lang="en-GB" sz="2933">
+                <a:solidFill>
+                  <a:schemeClr val="dk1"/>
+                </a:solidFill>
+              </a:rPr>
+              <a:t>X</a:t>
+            </a:r>
+            <a:r>
+              <a:rPr lang="en-GB" sz="2000">
+                <a:solidFill>
+                  <a:schemeClr val="dk1"/>
+                </a:solidFill>
+              </a:rPr>
+              <a:t>2</a:t>
+            </a:r>
+            <a:endParaRPr sz="2000">
+              <a:solidFill>
+                <a:schemeClr val="dk1"/>
+              </a:solidFill>
+            </a:endParaRPr>
+          </a:p>
+        </p:txBody>
+      </p:sp>
+      <p:sp>
+        <p:nvSpPr>
+          <p:cNvPr id="83" name="Google Shape;83;p14"/>
+          <p:cNvSpPr txBox="1"/>
+          <p:nvPr/>
+        </p:nvSpPr>
+        <p:spPr>
+          <a:xfrm>
+            <a:off x="750367" y="3707833"/>
+            <a:ext cx="5498000" cy="697523"/>
+          </a:xfrm>
+          <a:prstGeom prst="rect">
+            <a:avLst/>
+          </a:prstGeom>
+          <a:noFill/>
+          <a:ln>
+            <a:noFill/>
+          </a:ln>
+        </p:spPr>
+        <p:txBody>
+          <a:bodyPr spcFirstLastPara="1" wrap="square" lIns="121900" tIns="121900" rIns="121900" bIns="121900" anchor="t" anchorCtr="0">
+            <a:spAutoFit/>
+          </a:bodyPr>
+          <a:lstStyle/>
+          <a:p>
+            <a:r>
+              <a:rPr lang="en-GB" sz="2933">
+                <a:solidFill>
+                  <a:schemeClr val="dk1"/>
+                </a:solidFill>
+              </a:rPr>
+              <a:t>X</a:t>
+            </a:r>
+            <a:r>
+              <a:rPr lang="en-GB" sz="2000">
+                <a:solidFill>
+                  <a:schemeClr val="dk1"/>
+                </a:solidFill>
+              </a:rPr>
+              <a:t>3</a:t>
+            </a:r>
+            <a:endParaRPr sz="2000">
+              <a:solidFill>
+                <a:schemeClr val="dk1"/>
+              </a:solidFill>
+            </a:endParaRPr>
+          </a:p>
+        </p:txBody>
+      </p:sp>
+      <p:sp>
+        <p:nvSpPr>
+          <p:cNvPr id="84" name="Google Shape;84;p14"/>
+          <p:cNvSpPr txBox="1"/>
+          <p:nvPr/>
+        </p:nvSpPr>
+        <p:spPr>
+          <a:xfrm>
+            <a:off x="750367" y="5998633"/>
+            <a:ext cx="5498000" cy="697523"/>
+          </a:xfrm>
+          <a:prstGeom prst="rect">
+            <a:avLst/>
+          </a:prstGeom>
+          <a:noFill/>
+          <a:ln>
+            <a:noFill/>
+          </a:ln>
+        </p:spPr>
+        <p:txBody>
+          <a:bodyPr spcFirstLastPara="1" wrap="square" lIns="121900" tIns="121900" rIns="121900" bIns="121900" anchor="t" anchorCtr="0">
+            <a:spAutoFit/>
+          </a:bodyPr>
+          <a:lstStyle/>
+          <a:p>
+            <a:r>
+              <a:rPr lang="en-GB" sz="2933">
+                <a:solidFill>
+                  <a:schemeClr val="dk1"/>
+                </a:solidFill>
+              </a:rPr>
+              <a:t>X</a:t>
+            </a:r>
+            <a:r>
+              <a:rPr lang="en-GB" sz="2000">
+                <a:solidFill>
+                  <a:schemeClr val="dk1"/>
+                </a:solidFill>
+              </a:rPr>
+              <a:t>m</a:t>
+            </a:r>
+            <a:endParaRPr sz="2000">
+              <a:solidFill>
+                <a:schemeClr val="dk1"/>
+              </a:solidFill>
+            </a:endParaRPr>
+          </a:p>
+        </p:txBody>
+      </p:sp>
+      <p:sp>
+        <p:nvSpPr>
+          <p:cNvPr id="85" name="Google Shape;85;p14"/>
+          <p:cNvSpPr/>
+          <p:nvPr/>
+        </p:nvSpPr>
+        <p:spPr>
+          <a:xfrm>
+            <a:off x="4004600" y="1411500"/>
+            <a:ext cx="1284800" cy="697600"/>
+          </a:xfrm>
+          <a:prstGeom prst="roundRect">
+            <a:avLst>
+              <a:gd name="adj" fmla="val 16667"/>
+            </a:avLst>
+          </a:prstGeom>
+          <a:solidFill>
+            <a:srgbClr val="9FC5E8"/>
+          </a:solidFill>
+          <a:ln w="9525" cap="flat" cmpd="sng">
+            <a:solidFill>
+              <a:schemeClr val="dk2"/>
+            </a:solidFill>
+            <a:prstDash val="solid"/>
+            <a:round/>
+            <a:headEnd type="none" w="sm" len="sm"/>
+            <a:tailEnd type="none" w="sm" len="sm"/>
+          </a:ln>
+        </p:spPr>
+        <p:txBody>
+          <a:bodyPr spcFirstLastPara="1" wrap="square" lIns="121900" tIns="121900" rIns="121900" bIns="121900" anchor="ctr" anchorCtr="0">
+            <a:noAutofit/>
+          </a:bodyPr>
+          <a:lstStyle/>
+          <a:p>
+            <a:pPr algn="ctr"/>
+            <a:endParaRPr sz="2400"/>
+          </a:p>
+        </p:txBody>
+      </p:sp>
+      <p:sp>
+        <p:nvSpPr>
+          <p:cNvPr id="86" name="Google Shape;86;p14"/>
+          <p:cNvSpPr/>
+          <p:nvPr/>
+        </p:nvSpPr>
+        <p:spPr>
+          <a:xfrm>
+            <a:off x="4004600" y="2930651"/>
+            <a:ext cx="1284800" cy="697600"/>
+          </a:xfrm>
+          <a:prstGeom prst="roundRect">
+            <a:avLst>
+              <a:gd name="adj" fmla="val 16667"/>
+            </a:avLst>
+          </a:prstGeom>
+          <a:solidFill>
+            <a:srgbClr val="9FC5E8"/>
+          </a:solidFill>
+          <a:ln w="9525" cap="flat" cmpd="sng">
+            <a:solidFill>
+              <a:schemeClr val="dk2"/>
+            </a:solidFill>
+            <a:prstDash val="solid"/>
+            <a:round/>
+            <a:headEnd type="none" w="sm" len="sm"/>
+            <a:tailEnd type="none" w="sm" len="sm"/>
+          </a:ln>
+        </p:spPr>
+        <p:txBody>
+          <a:bodyPr spcFirstLastPara="1" wrap="square" lIns="121900" tIns="121900" rIns="121900" bIns="121900" anchor="ctr" anchorCtr="0">
+            <a:noAutofit/>
+          </a:bodyPr>
+          <a:lstStyle/>
+          <a:p>
+            <a:pPr algn="ctr"/>
+            <a:endParaRPr sz="2400"/>
+          </a:p>
+        </p:txBody>
+      </p:sp>
+      <p:sp>
+        <p:nvSpPr>
+          <p:cNvPr id="87" name="Google Shape;87;p14"/>
+          <p:cNvSpPr/>
+          <p:nvPr/>
+        </p:nvSpPr>
+        <p:spPr>
+          <a:xfrm>
+            <a:off x="4004600" y="4743800"/>
+            <a:ext cx="1284800" cy="697600"/>
+          </a:xfrm>
+          <a:prstGeom prst="roundRect">
+            <a:avLst>
+              <a:gd name="adj" fmla="val 16667"/>
+            </a:avLst>
+          </a:prstGeom>
+          <a:solidFill>
+            <a:srgbClr val="9FC5E8"/>
+          </a:solidFill>
+          <a:ln w="9525" cap="flat" cmpd="sng">
+            <a:solidFill>
+              <a:schemeClr val="dk2"/>
+            </a:solidFill>
+            <a:prstDash val="solid"/>
+            <a:round/>
+            <a:headEnd type="none" w="sm" len="sm"/>
+            <a:tailEnd type="none" w="sm" len="sm"/>
+          </a:ln>
+        </p:spPr>
+        <p:txBody>
+          <a:bodyPr spcFirstLastPara="1" wrap="square" lIns="121900" tIns="121900" rIns="121900" bIns="121900" anchor="ctr" anchorCtr="0">
+            <a:noAutofit/>
+          </a:bodyPr>
+          <a:lstStyle/>
+          <a:p>
+            <a:pPr algn="ctr"/>
+            <a:endParaRPr sz="2400"/>
+          </a:p>
+        </p:txBody>
+      </p:sp>
+      <p:cxnSp>
+        <p:nvCxnSpPr>
+          <p:cNvPr id="88" name="Google Shape;88;p14"/>
+          <p:cNvCxnSpPr/>
+          <p:nvPr/>
+        </p:nvCxnSpPr>
+        <p:spPr>
+          <a:xfrm>
+            <a:off x="1661900" y="1165867"/>
+            <a:ext cx="2116000" cy="585600"/>
+          </a:xfrm>
+          <a:prstGeom prst="straightConnector1">
+            <a:avLst/>
+          </a:prstGeom>
+          <a:noFill/>
+          <a:ln w="9525" cap="flat" cmpd="sng">
+            <a:solidFill>
+              <a:schemeClr val="dk2"/>
+            </a:solidFill>
+            <a:prstDash val="solid"/>
+            <a:round/>
+            <a:headEnd type="none" w="med" len="med"/>
+            <a:tailEnd type="triangle" w="med" len="med"/>
+          </a:ln>
+        </p:spPr>
+      </p:cxnSp>
+      <p:cxnSp>
+        <p:nvCxnSpPr>
+          <p:cNvPr id="89" name="Google Shape;89;p14"/>
+          <p:cNvCxnSpPr/>
+          <p:nvPr/>
+        </p:nvCxnSpPr>
+        <p:spPr>
+          <a:xfrm>
+            <a:off x="1661900" y="1165867"/>
+            <a:ext cx="2125600" cy="2087600"/>
+          </a:xfrm>
+          <a:prstGeom prst="straightConnector1">
+            <a:avLst/>
+          </a:prstGeom>
+          <a:noFill/>
+          <a:ln w="9525" cap="flat" cmpd="sng">
+            <a:solidFill>
+              <a:schemeClr val="dk2"/>
+            </a:solidFill>
+            <a:prstDash val="solid"/>
+            <a:round/>
+            <a:headEnd type="none" w="med" len="med"/>
+            <a:tailEnd type="triangle" w="med" len="med"/>
+          </a:ln>
+        </p:spPr>
+      </p:cxnSp>
+      <p:cxnSp>
+        <p:nvCxnSpPr>
+          <p:cNvPr id="90" name="Google Shape;90;p14"/>
+          <p:cNvCxnSpPr/>
+          <p:nvPr/>
+        </p:nvCxnSpPr>
+        <p:spPr>
+          <a:xfrm>
+            <a:off x="1661900" y="1175333"/>
+            <a:ext cx="2182000" cy="3892000"/>
+          </a:xfrm>
+          <a:prstGeom prst="straightConnector1">
+            <a:avLst/>
+          </a:prstGeom>
+          <a:noFill/>
+          <a:ln w="9525" cap="flat" cmpd="sng">
+            <a:solidFill>
+              <a:schemeClr val="dk2"/>
+            </a:solidFill>
+            <a:prstDash val="solid"/>
+            <a:round/>
+            <a:headEnd type="none" w="med" len="med"/>
+            <a:tailEnd type="triangle" w="med" len="med"/>
+          </a:ln>
+        </p:spPr>
+      </p:cxnSp>
+      <p:cxnSp>
+        <p:nvCxnSpPr>
+          <p:cNvPr id="91" name="Google Shape;91;p14"/>
+          <p:cNvCxnSpPr/>
+          <p:nvPr/>
+        </p:nvCxnSpPr>
+        <p:spPr>
+          <a:xfrm rot="10800000" flipH="1">
+            <a:off x="1586333" y="1779767"/>
+            <a:ext cx="2191600" cy="793600"/>
+          </a:xfrm>
+          <a:prstGeom prst="straightConnector1">
+            <a:avLst/>
+          </a:prstGeom>
+          <a:noFill/>
+          <a:ln w="9525" cap="flat" cmpd="sng">
+            <a:solidFill>
+              <a:schemeClr val="dk2"/>
+            </a:solidFill>
+            <a:prstDash val="solid"/>
+            <a:round/>
+            <a:headEnd type="none" w="med" len="med"/>
+            <a:tailEnd type="triangle" w="med" len="med"/>
+          </a:ln>
+        </p:spPr>
+      </p:cxnSp>
+      <p:cxnSp>
+        <p:nvCxnSpPr>
+          <p:cNvPr id="92" name="Google Shape;92;p14"/>
+          <p:cNvCxnSpPr/>
+          <p:nvPr/>
+        </p:nvCxnSpPr>
+        <p:spPr>
+          <a:xfrm>
+            <a:off x="1614700" y="2592267"/>
+            <a:ext cx="2134800" cy="652000"/>
+          </a:xfrm>
+          <a:prstGeom prst="straightConnector1">
+            <a:avLst/>
+          </a:prstGeom>
+          <a:noFill/>
+          <a:ln w="9525" cap="flat" cmpd="sng">
+            <a:solidFill>
+              <a:schemeClr val="dk2"/>
+            </a:solidFill>
+            <a:prstDash val="solid"/>
+            <a:round/>
+            <a:headEnd type="none" w="med" len="med"/>
+            <a:tailEnd type="triangle" w="med" len="med"/>
+          </a:ln>
+        </p:spPr>
+      </p:cxnSp>
+      <p:cxnSp>
+        <p:nvCxnSpPr>
+          <p:cNvPr id="93" name="Google Shape;93;p14"/>
+          <p:cNvCxnSpPr/>
+          <p:nvPr/>
+        </p:nvCxnSpPr>
+        <p:spPr>
+          <a:xfrm>
+            <a:off x="1614700" y="2573367"/>
+            <a:ext cx="2210400" cy="2484400"/>
+          </a:xfrm>
+          <a:prstGeom prst="straightConnector1">
+            <a:avLst/>
+          </a:prstGeom>
+          <a:noFill/>
+          <a:ln w="9525" cap="flat" cmpd="sng">
+            <a:solidFill>
+              <a:schemeClr val="dk2"/>
+            </a:solidFill>
+            <a:prstDash val="solid"/>
+            <a:round/>
+            <a:headEnd type="none" w="med" len="med"/>
+            <a:tailEnd type="triangle" w="med" len="med"/>
+          </a:ln>
+        </p:spPr>
+      </p:cxnSp>
+      <p:cxnSp>
+        <p:nvCxnSpPr>
+          <p:cNvPr id="94" name="Google Shape;94;p14"/>
+          <p:cNvCxnSpPr/>
+          <p:nvPr/>
+        </p:nvCxnSpPr>
+        <p:spPr>
+          <a:xfrm rot="10800000" flipH="1">
+            <a:off x="1473000" y="1789233"/>
+            <a:ext cx="2304800" cy="2267200"/>
+          </a:xfrm>
+          <a:prstGeom prst="straightConnector1">
+            <a:avLst/>
+          </a:prstGeom>
+          <a:noFill/>
+          <a:ln w="9525" cap="flat" cmpd="sng">
+            <a:solidFill>
+              <a:schemeClr val="dk2"/>
+            </a:solidFill>
+            <a:prstDash val="solid"/>
+            <a:round/>
+            <a:headEnd type="none" w="med" len="med"/>
+            <a:tailEnd type="triangle" w="med" len="med"/>
+          </a:ln>
+        </p:spPr>
+      </p:cxnSp>
+      <p:cxnSp>
+        <p:nvCxnSpPr>
+          <p:cNvPr id="95" name="Google Shape;95;p14"/>
+          <p:cNvCxnSpPr/>
+          <p:nvPr/>
+        </p:nvCxnSpPr>
+        <p:spPr>
+          <a:xfrm rot="10800000" flipH="1">
+            <a:off x="1482433" y="3281900"/>
+            <a:ext cx="2257600" cy="784000"/>
+          </a:xfrm>
+          <a:prstGeom prst="straightConnector1">
+            <a:avLst/>
+          </a:prstGeom>
+          <a:noFill/>
+          <a:ln w="9525" cap="flat" cmpd="sng">
+            <a:solidFill>
+              <a:schemeClr val="dk2"/>
+            </a:solidFill>
+            <a:prstDash val="solid"/>
+            <a:round/>
+            <a:headEnd type="none" w="med" len="med"/>
+            <a:tailEnd type="triangle" w="med" len="med"/>
+          </a:ln>
+        </p:spPr>
+      </p:cxnSp>
+      <p:cxnSp>
+        <p:nvCxnSpPr>
+          <p:cNvPr id="96" name="Google Shape;96;p14"/>
+          <p:cNvCxnSpPr/>
+          <p:nvPr/>
+        </p:nvCxnSpPr>
+        <p:spPr>
+          <a:xfrm>
+            <a:off x="1491867" y="4075333"/>
+            <a:ext cx="2352000" cy="992000"/>
+          </a:xfrm>
+          <a:prstGeom prst="straightConnector1">
+            <a:avLst/>
+          </a:prstGeom>
+          <a:noFill/>
+          <a:ln w="9525" cap="flat" cmpd="sng">
+            <a:solidFill>
+              <a:schemeClr val="dk2"/>
+            </a:solidFill>
+            <a:prstDash val="solid"/>
+            <a:round/>
+            <a:headEnd type="none" w="med" len="med"/>
+            <a:tailEnd type="triangle" w="med" len="med"/>
+          </a:ln>
+        </p:spPr>
+      </p:cxnSp>
+      <p:cxnSp>
+        <p:nvCxnSpPr>
+          <p:cNvPr id="97" name="Google Shape;97;p14"/>
+          <p:cNvCxnSpPr/>
+          <p:nvPr/>
+        </p:nvCxnSpPr>
+        <p:spPr>
+          <a:xfrm rot="10800000" flipH="1">
+            <a:off x="1473000" y="1817700"/>
+            <a:ext cx="2257600" cy="4496400"/>
+          </a:xfrm>
+          <a:prstGeom prst="straightConnector1">
+            <a:avLst/>
+          </a:prstGeom>
+          <a:noFill/>
+          <a:ln w="9525" cap="flat" cmpd="sng">
+            <a:solidFill>
+              <a:schemeClr val="dk2"/>
+            </a:solidFill>
+            <a:prstDash val="solid"/>
+            <a:round/>
+            <a:headEnd type="none" w="med" len="med"/>
+            <a:tailEnd type="triangle" w="med" len="med"/>
+          </a:ln>
+        </p:spPr>
+      </p:cxnSp>
+      <p:cxnSp>
+        <p:nvCxnSpPr>
+          <p:cNvPr id="98" name="Google Shape;98;p14"/>
+          <p:cNvCxnSpPr/>
+          <p:nvPr/>
+        </p:nvCxnSpPr>
+        <p:spPr>
+          <a:xfrm rot="10800000" flipH="1">
+            <a:off x="1473000" y="3319700"/>
+            <a:ext cx="2257600" cy="2994400"/>
+          </a:xfrm>
+          <a:prstGeom prst="straightConnector1">
+            <a:avLst/>
+          </a:prstGeom>
+          <a:noFill/>
+          <a:ln w="9525" cap="flat" cmpd="sng">
+            <a:solidFill>
+              <a:schemeClr val="dk2"/>
+            </a:solidFill>
+            <a:prstDash val="solid"/>
+            <a:round/>
+            <a:headEnd type="none" w="med" len="med"/>
+            <a:tailEnd type="triangle" w="med" len="med"/>
+          </a:ln>
+        </p:spPr>
+      </p:cxnSp>
+      <p:cxnSp>
+        <p:nvCxnSpPr>
+          <p:cNvPr id="99" name="Google Shape;99;p14"/>
+          <p:cNvCxnSpPr/>
+          <p:nvPr/>
+        </p:nvCxnSpPr>
+        <p:spPr>
+          <a:xfrm rot="10800000" flipH="1">
+            <a:off x="1491867" y="5114300"/>
+            <a:ext cx="2324000" cy="1237600"/>
+          </a:xfrm>
+          <a:prstGeom prst="straightConnector1">
+            <a:avLst/>
+          </a:prstGeom>
+          <a:noFill/>
+          <a:ln w="9525" cap="flat" cmpd="sng">
+            <a:solidFill>
+              <a:schemeClr val="dk2"/>
+            </a:solidFill>
+            <a:prstDash val="solid"/>
+            <a:round/>
+            <a:headEnd type="none" w="med" len="med"/>
+            <a:tailEnd type="triangle" w="med" len="med"/>
+          </a:ln>
+        </p:spPr>
+      </p:cxnSp>
+      <p:sp>
+        <p:nvSpPr>
+          <p:cNvPr id="100" name="Google Shape;100;p14"/>
+          <p:cNvSpPr txBox="1"/>
+          <p:nvPr/>
+        </p:nvSpPr>
+        <p:spPr>
+          <a:xfrm>
+            <a:off x="3995300" y="1409667"/>
+            <a:ext cx="1785600" cy="697523"/>
+          </a:xfrm>
+          <a:prstGeom prst="rect">
+            <a:avLst/>
+          </a:prstGeom>
+          <a:noFill/>
+          <a:ln>
+            <a:noFill/>
+          </a:ln>
+        </p:spPr>
+        <p:txBody>
+          <a:bodyPr spcFirstLastPara="1" wrap="square" lIns="121900" tIns="121900" rIns="121900" bIns="121900" anchor="t" anchorCtr="0">
+            <a:spAutoFit/>
+          </a:bodyPr>
+          <a:lstStyle/>
+          <a:p>
+            <a:r>
+              <a:rPr lang="en-GB" sz="2933">
+                <a:solidFill>
+                  <a:schemeClr val="dk1"/>
+                </a:solidFill>
+              </a:rPr>
+              <a:t>W</a:t>
+            </a:r>
+            <a:r>
+              <a:rPr lang="en-GB" sz="2400">
+                <a:solidFill>
+                  <a:schemeClr val="dk1"/>
+                </a:solidFill>
+              </a:rPr>
+              <a:t>1 </a:t>
+            </a:r>
+            <a:r>
+              <a:rPr lang="en-GB" sz="2933" b="1">
+                <a:solidFill>
+                  <a:schemeClr val="dk1"/>
+                </a:solidFill>
+              </a:rPr>
+              <a:t>⋅ </a:t>
+            </a:r>
+            <a:r>
+              <a:rPr lang="en-GB" sz="2400">
+                <a:solidFill>
+                  <a:schemeClr val="dk1"/>
+                </a:solidFill>
+              </a:rPr>
+              <a:t>X</a:t>
+            </a:r>
+            <a:endParaRPr sz="2400">
+              <a:solidFill>
+                <a:schemeClr val="dk1"/>
+              </a:solidFill>
+            </a:endParaRPr>
+          </a:p>
+        </p:txBody>
+      </p:sp>
+      <p:sp>
+        <p:nvSpPr>
+          <p:cNvPr id="101" name="Google Shape;101;p14"/>
+          <p:cNvSpPr txBox="1"/>
+          <p:nvPr/>
+        </p:nvSpPr>
+        <p:spPr>
+          <a:xfrm>
+            <a:off x="3985700" y="2930667"/>
+            <a:ext cx="1986000" cy="697523"/>
+          </a:xfrm>
+          <a:prstGeom prst="rect">
+            <a:avLst/>
+          </a:prstGeom>
+          <a:noFill/>
+          <a:ln>
+            <a:noFill/>
+          </a:ln>
+        </p:spPr>
+        <p:txBody>
+          <a:bodyPr spcFirstLastPara="1" wrap="square" lIns="121900" tIns="121900" rIns="121900" bIns="121900" anchor="t" anchorCtr="0">
+            <a:spAutoFit/>
+          </a:bodyPr>
+          <a:lstStyle/>
+          <a:p>
+            <a:r>
+              <a:rPr lang="en-GB" sz="2933">
+                <a:solidFill>
+                  <a:schemeClr val="dk1"/>
+                </a:solidFill>
+              </a:rPr>
+              <a:t>W</a:t>
+            </a:r>
+            <a:r>
+              <a:rPr lang="en-GB" sz="2400">
+                <a:solidFill>
+                  <a:schemeClr val="dk1"/>
+                </a:solidFill>
+              </a:rPr>
+              <a:t>2 </a:t>
+            </a:r>
+            <a:r>
+              <a:rPr lang="en-GB" sz="2933" b="1">
+                <a:solidFill>
+                  <a:schemeClr val="dk1"/>
+                </a:solidFill>
+              </a:rPr>
+              <a:t>⋅ </a:t>
+            </a:r>
+            <a:r>
+              <a:rPr lang="en-GB" sz="2400">
+                <a:solidFill>
+                  <a:schemeClr val="dk1"/>
+                </a:solidFill>
+              </a:rPr>
+              <a:t>X</a:t>
+            </a:r>
+            <a:endParaRPr sz="2400">
+              <a:solidFill>
+                <a:schemeClr val="dk1"/>
+              </a:solidFill>
+            </a:endParaRPr>
+          </a:p>
+        </p:txBody>
+      </p:sp>
+      <p:sp>
+        <p:nvSpPr>
+          <p:cNvPr id="102" name="Google Shape;102;p14"/>
+          <p:cNvSpPr txBox="1"/>
+          <p:nvPr/>
+        </p:nvSpPr>
+        <p:spPr>
+          <a:xfrm>
+            <a:off x="3995300" y="4743800"/>
+            <a:ext cx="1700400" cy="697523"/>
+          </a:xfrm>
+          <a:prstGeom prst="rect">
+            <a:avLst/>
+          </a:prstGeom>
+          <a:noFill/>
+          <a:ln>
+            <a:noFill/>
+          </a:ln>
+        </p:spPr>
+        <p:txBody>
+          <a:bodyPr spcFirstLastPara="1" wrap="square" lIns="121900" tIns="121900" rIns="121900" bIns="121900" anchor="t" anchorCtr="0">
+            <a:spAutoFit/>
+          </a:bodyPr>
+          <a:lstStyle/>
+          <a:p>
+            <a:r>
+              <a:rPr lang="en-GB" sz="2933">
+                <a:solidFill>
+                  <a:schemeClr val="dk1"/>
+                </a:solidFill>
+              </a:rPr>
+              <a:t>W</a:t>
+            </a:r>
+            <a:r>
+              <a:rPr lang="en-GB" sz="2400">
+                <a:solidFill>
+                  <a:schemeClr val="dk1"/>
+                </a:solidFill>
+              </a:rPr>
+              <a:t>k </a:t>
+            </a:r>
+            <a:r>
+              <a:rPr lang="en-GB" sz="2933" b="1">
+                <a:solidFill>
+                  <a:schemeClr val="dk1"/>
+                </a:solidFill>
+              </a:rPr>
+              <a:t>⋅ </a:t>
+            </a:r>
+            <a:r>
+              <a:rPr lang="en-GB" sz="2400">
+                <a:solidFill>
+                  <a:schemeClr val="dk1"/>
+                </a:solidFill>
+              </a:rPr>
+              <a:t>X</a:t>
+            </a:r>
+            <a:endParaRPr sz="2400">
+              <a:solidFill>
+                <a:schemeClr val="dk1"/>
+              </a:solidFill>
+            </a:endParaRPr>
+          </a:p>
+        </p:txBody>
+      </p:sp>
+      <p:sp>
+        <p:nvSpPr>
+          <p:cNvPr id="103" name="Google Shape;103;p14"/>
+          <p:cNvSpPr txBox="1"/>
+          <p:nvPr/>
+        </p:nvSpPr>
+        <p:spPr>
+          <a:xfrm>
+            <a:off x="4406133" y="3452101"/>
+            <a:ext cx="746400" cy="1354176"/>
+          </a:xfrm>
+          <a:prstGeom prst="rect">
+            <a:avLst/>
+          </a:prstGeom>
+          <a:noFill/>
+          <a:ln>
+            <a:noFill/>
+          </a:ln>
+        </p:spPr>
+        <p:txBody>
+          <a:bodyPr spcFirstLastPara="1" wrap="square" lIns="121900" tIns="121900" rIns="121900" bIns="121900" anchor="t" anchorCtr="0">
+            <a:spAutoFit/>
+          </a:bodyPr>
+          <a:lstStyle/>
+          <a:p>
+            <a:r>
+              <a:rPr lang="en-GB" sz="2400" b="1">
+                <a:solidFill>
+                  <a:schemeClr val="dk1"/>
+                </a:solidFill>
+              </a:rPr>
+              <a:t>.</a:t>
+            </a:r>
+            <a:endParaRPr sz="2400" b="1">
+              <a:solidFill>
+                <a:schemeClr val="dk1"/>
+              </a:solidFill>
+            </a:endParaRPr>
+          </a:p>
+          <a:p>
+            <a:r>
+              <a:rPr lang="en-GB" sz="2400" b="1">
+                <a:solidFill>
+                  <a:schemeClr val="dk1"/>
+                </a:solidFill>
+              </a:rPr>
+              <a:t>.</a:t>
+            </a:r>
+            <a:endParaRPr sz="2400" b="1">
+              <a:solidFill>
+                <a:schemeClr val="dk1"/>
+              </a:solidFill>
+            </a:endParaRPr>
+          </a:p>
+          <a:p>
+            <a:r>
+              <a:rPr lang="en-GB" sz="2400" b="1">
+                <a:solidFill>
+                  <a:schemeClr val="dk1"/>
+                </a:solidFill>
+              </a:rPr>
+              <a:t>.</a:t>
+            </a:r>
+            <a:endParaRPr sz="2400" b="1">
+              <a:solidFill>
+                <a:schemeClr val="dk1"/>
+              </a:solidFill>
+            </a:endParaRPr>
+          </a:p>
+        </p:txBody>
+      </p:sp>
+      <p:sp>
+        <p:nvSpPr>
+          <p:cNvPr id="104" name="Google Shape;104;p14"/>
+          <p:cNvSpPr/>
+          <p:nvPr/>
+        </p:nvSpPr>
+        <p:spPr>
+          <a:xfrm>
+            <a:off x="5791200" y="1141500"/>
+            <a:ext cx="2125600" cy="1237600"/>
+          </a:xfrm>
+          <a:prstGeom prst="rect">
+            <a:avLst/>
+          </a:prstGeom>
+          <a:solidFill>
+            <a:srgbClr val="FFFFFF"/>
+          </a:solidFill>
+          <a:ln w="38100" cap="flat" cmpd="sng">
+            <a:solidFill>
+              <a:srgbClr val="FF0000"/>
+            </a:solidFill>
+            <a:prstDash val="solid"/>
+            <a:round/>
+            <a:headEnd type="none" w="sm" len="sm"/>
+            <a:tailEnd type="none" w="sm" len="sm"/>
+          </a:ln>
+        </p:spPr>
+        <p:txBody>
+          <a:bodyPr spcFirstLastPara="1" wrap="square" lIns="121900" tIns="121900" rIns="121900" bIns="121900" anchor="ctr" anchorCtr="0">
+            <a:noAutofit/>
+          </a:bodyPr>
+          <a:lstStyle/>
+          <a:p>
+            <a:pPr algn="ctr"/>
+            <a:endParaRPr sz="2400"/>
+          </a:p>
+        </p:txBody>
+      </p:sp>
+      <p:sp>
+        <p:nvSpPr>
+          <p:cNvPr id="105" name="Google Shape;105;p14"/>
+          <p:cNvSpPr/>
+          <p:nvPr/>
+        </p:nvSpPr>
+        <p:spPr>
+          <a:xfrm>
+            <a:off x="5791200" y="2660667"/>
+            <a:ext cx="2125600" cy="1237600"/>
+          </a:xfrm>
+          <a:prstGeom prst="rect">
+            <a:avLst/>
+          </a:prstGeom>
+          <a:solidFill>
+            <a:srgbClr val="FFFFFF"/>
+          </a:solidFill>
+          <a:ln w="38100" cap="flat" cmpd="sng">
+            <a:solidFill>
+              <a:srgbClr val="FF0000"/>
+            </a:solidFill>
+            <a:prstDash val="solid"/>
+            <a:round/>
+            <a:headEnd type="none" w="sm" len="sm"/>
+            <a:tailEnd type="none" w="sm" len="sm"/>
+          </a:ln>
+        </p:spPr>
+        <p:txBody>
+          <a:bodyPr spcFirstLastPara="1" wrap="square" lIns="121900" tIns="121900" rIns="121900" bIns="121900" anchor="ctr" anchorCtr="0">
+            <a:noAutofit/>
+          </a:bodyPr>
+          <a:lstStyle/>
+          <a:p>
+            <a:pPr algn="ctr"/>
+            <a:endParaRPr sz="2400"/>
+          </a:p>
+        </p:txBody>
+      </p:sp>
+      <p:sp>
+        <p:nvSpPr>
+          <p:cNvPr id="106" name="Google Shape;106;p14"/>
+          <p:cNvSpPr/>
+          <p:nvPr/>
+        </p:nvSpPr>
+        <p:spPr>
+          <a:xfrm>
+            <a:off x="5791200" y="4451667"/>
+            <a:ext cx="2125600" cy="1237600"/>
+          </a:xfrm>
+          <a:prstGeom prst="rect">
+            <a:avLst/>
+          </a:prstGeom>
+          <a:solidFill>
+            <a:srgbClr val="FFFFFF"/>
+          </a:solidFill>
+          <a:ln w="38100" cap="flat" cmpd="sng">
+            <a:solidFill>
+              <a:srgbClr val="FF0000"/>
+            </a:solidFill>
+            <a:prstDash val="solid"/>
+            <a:round/>
+            <a:headEnd type="none" w="sm" len="sm"/>
+            <a:tailEnd type="none" w="sm" len="sm"/>
+          </a:ln>
+        </p:spPr>
+        <p:txBody>
+          <a:bodyPr spcFirstLastPara="1" wrap="square" lIns="121900" tIns="121900" rIns="121900" bIns="121900" anchor="ctr" anchorCtr="0">
+            <a:noAutofit/>
+          </a:bodyPr>
+          <a:lstStyle/>
+          <a:p>
+            <a:pPr algn="ctr"/>
+            <a:endParaRPr sz="2400"/>
+          </a:p>
+        </p:txBody>
+      </p:sp>
+      <p:cxnSp>
+        <p:nvCxnSpPr>
+          <p:cNvPr id="107" name="Google Shape;107;p14"/>
+          <p:cNvCxnSpPr/>
+          <p:nvPr/>
+        </p:nvCxnSpPr>
+        <p:spPr>
+          <a:xfrm>
+            <a:off x="5319333" y="1768567"/>
+            <a:ext cx="330000" cy="0"/>
+          </a:xfrm>
+          <a:prstGeom prst="straightConnector1">
+            <a:avLst/>
+          </a:prstGeom>
+          <a:noFill/>
+          <a:ln w="9525" cap="flat" cmpd="sng">
+            <a:solidFill>
+              <a:schemeClr val="dk2"/>
+            </a:solidFill>
+            <a:prstDash val="solid"/>
+            <a:round/>
+            <a:headEnd type="none" w="med" len="med"/>
+            <a:tailEnd type="triangle" w="med" len="med"/>
+          </a:ln>
+        </p:spPr>
+      </p:cxnSp>
+      <p:cxnSp>
+        <p:nvCxnSpPr>
+          <p:cNvPr id="108" name="Google Shape;108;p14"/>
+          <p:cNvCxnSpPr/>
+          <p:nvPr/>
+        </p:nvCxnSpPr>
+        <p:spPr>
+          <a:xfrm>
+            <a:off x="5319333" y="3287333"/>
+            <a:ext cx="330000" cy="0"/>
+          </a:xfrm>
+          <a:prstGeom prst="straightConnector1">
+            <a:avLst/>
+          </a:prstGeom>
+          <a:noFill/>
+          <a:ln w="9525" cap="flat" cmpd="sng">
+            <a:solidFill>
+              <a:schemeClr val="dk2"/>
+            </a:solidFill>
+            <a:prstDash val="solid"/>
+            <a:round/>
+            <a:headEnd type="none" w="med" len="med"/>
+            <a:tailEnd type="triangle" w="med" len="med"/>
+          </a:ln>
+        </p:spPr>
+      </p:cxnSp>
+      <p:cxnSp>
+        <p:nvCxnSpPr>
+          <p:cNvPr id="109" name="Google Shape;109;p14"/>
+          <p:cNvCxnSpPr/>
+          <p:nvPr/>
+        </p:nvCxnSpPr>
+        <p:spPr>
+          <a:xfrm>
+            <a:off x="5338200" y="5098533"/>
+            <a:ext cx="311200" cy="9600"/>
+          </a:xfrm>
+          <a:prstGeom prst="straightConnector1">
+            <a:avLst/>
+          </a:prstGeom>
+          <a:noFill/>
+          <a:ln w="9525" cap="flat" cmpd="sng">
+            <a:solidFill>
+              <a:schemeClr val="dk2"/>
+            </a:solidFill>
+            <a:prstDash val="solid"/>
+            <a:round/>
+            <a:headEnd type="none" w="med" len="med"/>
+            <a:tailEnd type="triangle" w="med" len="med"/>
+          </a:ln>
+        </p:spPr>
+      </p:cxnSp>
+      <p:pic>
+        <p:nvPicPr>
+          <p:cNvPr id="110" name="Google Shape;110;p14"/>
+          <p:cNvPicPr preferRelativeResize="0"/>
+          <p:nvPr/>
+        </p:nvPicPr>
+        <p:blipFill>
+          <a:blip r:embed="rId3">
+            <a:alphaModFix/>
+          </a:blip>
+          <a:stretch>
+            <a:fillRect/>
+          </a:stretch>
+        </p:blipFill>
+        <p:spPr>
+          <a:xfrm>
+            <a:off x="5791200" y="1176317"/>
+            <a:ext cx="2024133" cy="1184500"/>
+          </a:xfrm>
+          <a:prstGeom prst="rect">
+            <a:avLst/>
+          </a:prstGeom>
+          <a:noFill/>
+          <a:ln>
+            <a:noFill/>
+          </a:ln>
+        </p:spPr>
+      </p:pic>
+      <p:pic>
+        <p:nvPicPr>
+          <p:cNvPr id="111" name="Google Shape;111;p14"/>
+          <p:cNvPicPr preferRelativeResize="0"/>
+          <p:nvPr/>
+        </p:nvPicPr>
+        <p:blipFill>
+          <a:blip r:embed="rId4">
+            <a:alphaModFix/>
+          </a:blip>
+          <a:stretch>
+            <a:fillRect/>
+          </a:stretch>
+        </p:blipFill>
+        <p:spPr>
+          <a:xfrm>
+            <a:off x="5832634" y="2676618"/>
+            <a:ext cx="1999300" cy="1168549"/>
+          </a:xfrm>
+          <a:prstGeom prst="rect">
+            <a:avLst/>
+          </a:prstGeom>
+          <a:noFill/>
+          <a:ln>
+            <a:noFill/>
+          </a:ln>
+        </p:spPr>
+      </p:pic>
+      <p:pic>
+        <p:nvPicPr>
+          <p:cNvPr id="112" name="Google Shape;112;p14"/>
+          <p:cNvPicPr preferRelativeResize="0"/>
+          <p:nvPr/>
+        </p:nvPicPr>
+        <p:blipFill>
+          <a:blip r:embed="rId5">
+            <a:alphaModFix/>
+          </a:blip>
+          <a:stretch>
+            <a:fillRect/>
+          </a:stretch>
+        </p:blipFill>
+        <p:spPr>
+          <a:xfrm>
+            <a:off x="5819033" y="4485002"/>
+            <a:ext cx="1985832" cy="1184500"/>
+          </a:xfrm>
+          <a:prstGeom prst="rect">
+            <a:avLst/>
+          </a:prstGeom>
+          <a:noFill/>
+          <a:ln>
+            <a:noFill/>
+          </a:ln>
+        </p:spPr>
+      </p:pic>
+      <p:sp>
+        <p:nvSpPr>
+          <p:cNvPr id="113" name="Google Shape;113;p14"/>
+          <p:cNvSpPr/>
+          <p:nvPr/>
+        </p:nvSpPr>
+        <p:spPr>
+          <a:xfrm>
+            <a:off x="9101500" y="1357384"/>
+            <a:ext cx="812400" cy="831200"/>
+          </a:xfrm>
+          <a:prstGeom prst="ellipse">
+            <a:avLst/>
+          </a:prstGeom>
+          <a:solidFill>
+            <a:srgbClr val="E06666"/>
+          </a:solidFill>
+          <a:ln w="9525" cap="flat" cmpd="sng">
+            <a:solidFill>
+              <a:schemeClr val="dk2"/>
+            </a:solidFill>
+            <a:prstDash val="solid"/>
+            <a:round/>
+            <a:headEnd type="none" w="sm" len="sm"/>
+            <a:tailEnd type="none" w="sm" len="sm"/>
+          </a:ln>
+        </p:spPr>
+        <p:txBody>
+          <a:bodyPr spcFirstLastPara="1" wrap="square" lIns="121900" tIns="121900" rIns="121900" bIns="121900" anchor="ctr" anchorCtr="0">
+            <a:noAutofit/>
+          </a:bodyPr>
+          <a:lstStyle/>
+          <a:p>
+            <a:pPr algn="ctr"/>
+            <a:endParaRPr sz="2400">
+              <a:solidFill>
+                <a:schemeClr val="dk1"/>
+              </a:solidFill>
+              <a:highlight>
+                <a:schemeClr val="dk1"/>
+              </a:highlight>
+            </a:endParaRPr>
+          </a:p>
+        </p:txBody>
+      </p:sp>
+      <p:sp>
+        <p:nvSpPr>
+          <p:cNvPr id="114" name="Google Shape;114;p14"/>
+          <p:cNvSpPr/>
+          <p:nvPr/>
+        </p:nvSpPr>
+        <p:spPr>
+          <a:xfrm>
+            <a:off x="9101500" y="2886251"/>
+            <a:ext cx="812400" cy="831200"/>
+          </a:xfrm>
+          <a:prstGeom prst="ellipse">
+            <a:avLst/>
+          </a:prstGeom>
+          <a:solidFill>
+            <a:srgbClr val="E06666"/>
+          </a:solidFill>
+          <a:ln w="9525" cap="flat" cmpd="sng">
+            <a:solidFill>
+              <a:schemeClr val="dk2"/>
+            </a:solidFill>
+            <a:prstDash val="solid"/>
+            <a:round/>
+            <a:headEnd type="none" w="sm" len="sm"/>
+            <a:tailEnd type="none" w="sm" len="sm"/>
+          </a:ln>
+        </p:spPr>
+        <p:txBody>
+          <a:bodyPr spcFirstLastPara="1" wrap="square" lIns="121900" tIns="121900" rIns="121900" bIns="121900" anchor="ctr" anchorCtr="0">
+            <a:noAutofit/>
+          </a:bodyPr>
+          <a:lstStyle/>
+          <a:p>
+            <a:pPr algn="ctr"/>
+            <a:endParaRPr sz="2400">
+              <a:solidFill>
+                <a:schemeClr val="dk1"/>
+              </a:solidFill>
+              <a:highlight>
+                <a:schemeClr val="dk1"/>
+              </a:highlight>
+            </a:endParaRPr>
+          </a:p>
+        </p:txBody>
+      </p:sp>
+      <p:sp>
+        <p:nvSpPr>
+          <p:cNvPr id="115" name="Google Shape;115;p14"/>
+          <p:cNvSpPr/>
+          <p:nvPr/>
+        </p:nvSpPr>
+        <p:spPr>
+          <a:xfrm>
+            <a:off x="9101500" y="4669384"/>
+            <a:ext cx="812400" cy="831200"/>
+          </a:xfrm>
+          <a:prstGeom prst="ellipse">
+            <a:avLst/>
+          </a:prstGeom>
+          <a:solidFill>
+            <a:srgbClr val="E06666"/>
+          </a:solidFill>
+          <a:ln w="9525" cap="flat" cmpd="sng">
+            <a:solidFill>
+              <a:schemeClr val="dk2"/>
+            </a:solidFill>
+            <a:prstDash val="solid"/>
+            <a:round/>
+            <a:headEnd type="none" w="sm" len="sm"/>
+            <a:tailEnd type="none" w="sm" len="sm"/>
+          </a:ln>
+        </p:spPr>
+        <p:txBody>
+          <a:bodyPr spcFirstLastPara="1" wrap="square" lIns="121900" tIns="121900" rIns="121900" bIns="121900" anchor="ctr" anchorCtr="0">
+            <a:noAutofit/>
+          </a:bodyPr>
+          <a:lstStyle/>
+          <a:p>
+            <a:pPr algn="ctr"/>
+            <a:endParaRPr sz="2400">
+              <a:solidFill>
+                <a:schemeClr val="dk1"/>
+              </a:solidFill>
+              <a:highlight>
+                <a:schemeClr val="dk1"/>
+              </a:highlight>
+            </a:endParaRPr>
+          </a:p>
+        </p:txBody>
+      </p:sp>
+      <p:sp>
+        <p:nvSpPr>
+          <p:cNvPr id="116" name="Google Shape;116;p14"/>
+          <p:cNvSpPr txBox="1"/>
+          <p:nvPr/>
+        </p:nvSpPr>
+        <p:spPr>
+          <a:xfrm>
+            <a:off x="9210167" y="1424184"/>
+            <a:ext cx="5498000" cy="697523"/>
+          </a:xfrm>
+          <a:prstGeom prst="rect">
+            <a:avLst/>
+          </a:prstGeom>
+          <a:noFill/>
+          <a:ln>
+            <a:noFill/>
+          </a:ln>
+        </p:spPr>
+        <p:txBody>
+          <a:bodyPr spcFirstLastPara="1" wrap="square" lIns="121900" tIns="121900" rIns="121900" bIns="121900" anchor="t" anchorCtr="0">
+            <a:spAutoFit/>
+          </a:bodyPr>
+          <a:lstStyle/>
+          <a:p>
+            <a:r>
+              <a:rPr lang="en-GB" sz="2933">
+                <a:solidFill>
+                  <a:schemeClr val="dk1"/>
+                </a:solidFill>
+              </a:rPr>
+              <a:t>P</a:t>
+            </a:r>
+            <a:r>
+              <a:rPr lang="en-GB" sz="2000">
+                <a:solidFill>
+                  <a:schemeClr val="dk1"/>
+                </a:solidFill>
+              </a:rPr>
+              <a:t>1</a:t>
+            </a:r>
+            <a:endParaRPr sz="2000">
+              <a:solidFill>
+                <a:schemeClr val="dk1"/>
+              </a:solidFill>
+            </a:endParaRPr>
+          </a:p>
+        </p:txBody>
+      </p:sp>
+      <p:sp>
+        <p:nvSpPr>
+          <p:cNvPr id="117" name="Google Shape;117;p14"/>
+          <p:cNvSpPr txBox="1"/>
+          <p:nvPr/>
+        </p:nvSpPr>
+        <p:spPr>
+          <a:xfrm>
+            <a:off x="9210167" y="2919651"/>
+            <a:ext cx="5498000" cy="697523"/>
+          </a:xfrm>
+          <a:prstGeom prst="rect">
+            <a:avLst/>
+          </a:prstGeom>
+          <a:noFill/>
+          <a:ln>
+            <a:noFill/>
+          </a:ln>
+        </p:spPr>
+        <p:txBody>
+          <a:bodyPr spcFirstLastPara="1" wrap="square" lIns="121900" tIns="121900" rIns="121900" bIns="121900" anchor="t" anchorCtr="0">
+            <a:spAutoFit/>
+          </a:bodyPr>
+          <a:lstStyle/>
+          <a:p>
+            <a:r>
+              <a:rPr lang="en-GB" sz="2933">
+                <a:solidFill>
+                  <a:schemeClr val="dk1"/>
+                </a:solidFill>
+              </a:rPr>
+              <a:t>P</a:t>
+            </a:r>
+            <a:r>
+              <a:rPr lang="en-GB" sz="2000">
+                <a:solidFill>
+                  <a:schemeClr val="dk1"/>
+                </a:solidFill>
+              </a:rPr>
+              <a:t>2</a:t>
+            </a:r>
+            <a:endParaRPr sz="2000">
+              <a:solidFill>
+                <a:schemeClr val="dk1"/>
+              </a:solidFill>
+            </a:endParaRPr>
+          </a:p>
+        </p:txBody>
+      </p:sp>
+      <p:sp>
+        <p:nvSpPr>
+          <p:cNvPr id="118" name="Google Shape;118;p14"/>
+          <p:cNvSpPr txBox="1"/>
+          <p:nvPr/>
+        </p:nvSpPr>
+        <p:spPr>
+          <a:xfrm>
+            <a:off x="9210167" y="4736184"/>
+            <a:ext cx="5498000" cy="697523"/>
+          </a:xfrm>
+          <a:prstGeom prst="rect">
+            <a:avLst/>
+          </a:prstGeom>
+          <a:noFill/>
+          <a:ln>
+            <a:noFill/>
+          </a:ln>
+        </p:spPr>
+        <p:txBody>
+          <a:bodyPr spcFirstLastPara="1" wrap="square" lIns="121900" tIns="121900" rIns="121900" bIns="121900" anchor="t" anchorCtr="0">
+            <a:spAutoFit/>
+          </a:bodyPr>
+          <a:lstStyle/>
+          <a:p>
+            <a:r>
+              <a:rPr lang="en-GB" sz="2933">
+                <a:solidFill>
+                  <a:schemeClr val="dk1"/>
+                </a:solidFill>
+              </a:rPr>
+              <a:t>P</a:t>
+            </a:r>
+            <a:r>
+              <a:rPr lang="en-GB" sz="2000">
+                <a:solidFill>
+                  <a:schemeClr val="dk1"/>
+                </a:solidFill>
+              </a:rPr>
+              <a:t>3</a:t>
+            </a:r>
+            <a:endParaRPr sz="2000">
+              <a:solidFill>
+                <a:schemeClr val="dk1"/>
+              </a:solidFill>
+            </a:endParaRPr>
+          </a:p>
+        </p:txBody>
+      </p:sp>
+      <p:sp>
+        <p:nvSpPr>
+          <p:cNvPr id="119" name="Google Shape;119;p14"/>
+          <p:cNvSpPr txBox="1"/>
+          <p:nvPr/>
+        </p:nvSpPr>
+        <p:spPr>
+          <a:xfrm>
+            <a:off x="9288867" y="3665734"/>
+            <a:ext cx="746400" cy="1021778"/>
+          </a:xfrm>
+          <a:prstGeom prst="rect">
+            <a:avLst/>
+          </a:prstGeom>
+          <a:noFill/>
+          <a:ln>
+            <a:noFill/>
+          </a:ln>
+        </p:spPr>
+        <p:txBody>
+          <a:bodyPr spcFirstLastPara="1" wrap="square" lIns="121900" tIns="121900" rIns="121900" bIns="121900" anchor="t" anchorCtr="0">
+            <a:spAutoFit/>
+          </a:bodyPr>
+          <a:lstStyle/>
+          <a:p>
+            <a:pPr>
+              <a:lnSpc>
+                <a:spcPct val="70000"/>
+              </a:lnSpc>
+            </a:pPr>
+            <a:r>
+              <a:rPr lang="en-GB" sz="2400" b="1">
+                <a:solidFill>
+                  <a:schemeClr val="dk1"/>
+                </a:solidFill>
+              </a:rPr>
+              <a:t>.</a:t>
+            </a:r>
+            <a:endParaRPr sz="2400" b="1">
+              <a:solidFill>
+                <a:schemeClr val="dk1"/>
+              </a:solidFill>
+            </a:endParaRPr>
+          </a:p>
+          <a:p>
+            <a:pPr>
+              <a:lnSpc>
+                <a:spcPct val="70000"/>
+              </a:lnSpc>
+            </a:pPr>
+            <a:r>
+              <a:rPr lang="en-GB" sz="2400" b="1">
+                <a:solidFill>
+                  <a:schemeClr val="dk1"/>
+                </a:solidFill>
+              </a:rPr>
+              <a:t>.</a:t>
+            </a:r>
+            <a:endParaRPr sz="2400" b="1">
+              <a:solidFill>
+                <a:schemeClr val="dk1"/>
+              </a:solidFill>
+            </a:endParaRPr>
+          </a:p>
+          <a:p>
+            <a:pPr>
+              <a:lnSpc>
+                <a:spcPct val="70000"/>
+              </a:lnSpc>
+            </a:pPr>
+            <a:r>
+              <a:rPr lang="en-GB" sz="2400" b="1">
+                <a:solidFill>
+                  <a:schemeClr val="dk1"/>
+                </a:solidFill>
+              </a:rPr>
+              <a:t>.</a:t>
+            </a:r>
+            <a:endParaRPr sz="2400" b="1">
+              <a:solidFill>
+                <a:schemeClr val="dk1"/>
+              </a:solidFill>
+            </a:endParaRPr>
+          </a:p>
+        </p:txBody>
+      </p:sp>
+      <p:sp>
+        <p:nvSpPr>
+          <p:cNvPr id="120" name="Google Shape;120;p14"/>
+          <p:cNvSpPr txBox="1"/>
+          <p:nvPr/>
+        </p:nvSpPr>
+        <p:spPr>
+          <a:xfrm>
+            <a:off x="5961200" y="435633"/>
+            <a:ext cx="1785600" cy="615513"/>
+          </a:xfrm>
+          <a:prstGeom prst="rect">
+            <a:avLst/>
+          </a:prstGeom>
+          <a:noFill/>
+          <a:ln>
+            <a:noFill/>
+          </a:ln>
+        </p:spPr>
+        <p:txBody>
+          <a:bodyPr spcFirstLastPara="1" wrap="square" lIns="121900" tIns="121900" rIns="121900" bIns="121900" anchor="t" anchorCtr="0">
+            <a:spAutoFit/>
+          </a:bodyPr>
+          <a:lstStyle/>
+          <a:p>
+            <a:pPr algn="ctr"/>
+            <a:r>
+              <a:rPr lang="en-GB" sz="2400" b="1">
+                <a:solidFill>
+                  <a:schemeClr val="dk1"/>
+                </a:solidFill>
+              </a:rPr>
+              <a:t>softmax            </a:t>
+            </a:r>
+            <a:endParaRPr sz="2400" b="1">
+              <a:solidFill>
+                <a:schemeClr val="dk1"/>
+              </a:solidFill>
+            </a:endParaRPr>
+          </a:p>
+        </p:txBody>
+      </p:sp>
+      <p:cxnSp>
+        <p:nvCxnSpPr>
+          <p:cNvPr id="121" name="Google Shape;121;p14"/>
+          <p:cNvCxnSpPr>
+            <a:stCxn id="104" idx="3"/>
+          </p:cNvCxnSpPr>
+          <p:nvPr/>
+        </p:nvCxnSpPr>
+        <p:spPr>
+          <a:xfrm>
+            <a:off x="7916800" y="1760300"/>
+            <a:ext cx="975600" cy="5200"/>
+          </a:xfrm>
+          <a:prstGeom prst="straightConnector1">
+            <a:avLst/>
+          </a:prstGeom>
+          <a:noFill/>
+          <a:ln w="9525" cap="flat" cmpd="sng">
+            <a:solidFill>
+              <a:schemeClr val="dk2"/>
+            </a:solidFill>
+            <a:prstDash val="solid"/>
+            <a:round/>
+            <a:headEnd type="none" w="med" len="med"/>
+            <a:tailEnd type="triangle" w="med" len="med"/>
+          </a:ln>
+        </p:spPr>
+      </p:cxnSp>
+      <p:cxnSp>
+        <p:nvCxnSpPr>
+          <p:cNvPr id="122" name="Google Shape;122;p14"/>
+          <p:cNvCxnSpPr>
+            <a:stCxn id="105" idx="3"/>
+          </p:cNvCxnSpPr>
+          <p:nvPr/>
+        </p:nvCxnSpPr>
+        <p:spPr>
+          <a:xfrm>
+            <a:off x="7916800" y="3279467"/>
+            <a:ext cx="975600" cy="20400"/>
+          </a:xfrm>
+          <a:prstGeom prst="straightConnector1">
+            <a:avLst/>
+          </a:prstGeom>
+          <a:noFill/>
+          <a:ln w="9525" cap="flat" cmpd="sng">
+            <a:solidFill>
+              <a:schemeClr val="dk2"/>
+            </a:solidFill>
+            <a:prstDash val="solid"/>
+            <a:round/>
+            <a:headEnd type="none" w="med" len="med"/>
+            <a:tailEnd type="triangle" w="med" len="med"/>
+          </a:ln>
+        </p:spPr>
+      </p:cxnSp>
+      <p:cxnSp>
+        <p:nvCxnSpPr>
+          <p:cNvPr id="123" name="Google Shape;123;p14"/>
+          <p:cNvCxnSpPr>
+            <a:stCxn id="106" idx="3"/>
+          </p:cNvCxnSpPr>
+          <p:nvPr/>
+        </p:nvCxnSpPr>
+        <p:spPr>
+          <a:xfrm>
+            <a:off x="7916800" y="5070467"/>
+            <a:ext cx="975600" cy="39600"/>
+          </a:xfrm>
+          <a:prstGeom prst="straightConnector1">
+            <a:avLst/>
+          </a:prstGeom>
+          <a:noFill/>
+          <a:ln w="9525" cap="flat" cmpd="sng">
+            <a:solidFill>
+              <a:schemeClr val="dk2"/>
+            </a:solidFill>
+            <a:prstDash val="solid"/>
+            <a:round/>
+            <a:headEnd type="none" w="med" len="med"/>
+            <a:tailEnd type="triangle" w="med" len="med"/>
+          </a:ln>
+        </p:spPr>
+      </p:cxnSp>
+      <p:sp>
+        <p:nvSpPr>
+          <p:cNvPr id="124" name="Google Shape;124;p14"/>
+          <p:cNvSpPr txBox="1"/>
+          <p:nvPr/>
+        </p:nvSpPr>
+        <p:spPr>
+          <a:xfrm>
+            <a:off x="8060067" y="250834"/>
+            <a:ext cx="3204000" cy="984845"/>
+          </a:xfrm>
+          <a:prstGeom prst="rect">
+            <a:avLst/>
+          </a:prstGeom>
+          <a:noFill/>
+          <a:ln>
+            <a:noFill/>
+          </a:ln>
+        </p:spPr>
+        <p:txBody>
+          <a:bodyPr spcFirstLastPara="1" wrap="square" lIns="121900" tIns="121900" rIns="121900" bIns="121900" anchor="t" anchorCtr="0">
+            <a:spAutoFit/>
+          </a:bodyPr>
+          <a:lstStyle/>
+          <a:p>
+            <a:pPr algn="ctr"/>
+            <a:r>
+              <a:rPr lang="en-GB" sz="2400" b="1">
+                <a:solidFill>
+                  <a:schemeClr val="dk1"/>
+                </a:solidFill>
+              </a:rPr>
+              <a:t>class</a:t>
+            </a:r>
+            <a:endParaRPr sz="2400" b="1">
+              <a:solidFill>
+                <a:schemeClr val="dk1"/>
+              </a:solidFill>
+            </a:endParaRPr>
+          </a:p>
+          <a:p>
+            <a:pPr algn="ctr"/>
+            <a:r>
+              <a:rPr lang="en-GB" sz="2400" b="1">
+                <a:solidFill>
+                  <a:schemeClr val="dk1"/>
+                </a:solidFill>
+              </a:rPr>
+              <a:t>probabilities</a:t>
+            </a:r>
+            <a:endParaRPr sz="2400" b="1">
+              <a:solidFill>
+                <a:schemeClr val="dk1"/>
+              </a:solidFill>
+            </a:endParaRPr>
+          </a:p>
+        </p:txBody>
+      </p:sp>
+    </p:spTree>
+  </p:cSld>
+  <p:clrMapOvr>
+    <a:masterClrMapping/>
+  </p:clrMapOvr>
+</p:sld>
+</file>
+
 <file path=ppt/theme/theme1.xml><?xml version="1.0" encoding="utf-8"?>
 <a:theme xmlns:a="http://schemas.openxmlformats.org/drawingml/2006/main" name="Office Theme">
   <a:themeElements>
@@ -4370,4 +8243,319 @@
     </a:ext>
   </a:extLst>
 </a:theme>
+</file>
+
+<file path=ppt/theme/theme2.xml><?xml version="1.0" encoding="utf-8"?>
+<a:theme xmlns:a="http://schemas.openxmlformats.org/drawingml/2006/main" name="Office Theme">
+  <a:themeElements>
+    <a:clrScheme name="Office">
+      <a:dk1>
+        <a:sysClr val="windowText" lastClr="000000"/>
+      </a:dk1>
+      <a:lt1>
+        <a:sysClr val="window" lastClr="FFFFFF"/>
+      </a:lt1>
+      <a:dk2>
+        <a:srgbClr val="0E2841"/>
+      </a:dk2>
+      <a:lt2>
+        <a:srgbClr val="E8E8E8"/>
+      </a:lt2>
+      <a:accent1>
+        <a:srgbClr val="156082"/>
+      </a:accent1>
+      <a:accent2>
+        <a:srgbClr val="E97132"/>
+      </a:accent2>
+      <a:accent3>
+        <a:srgbClr val="196B24"/>
+      </a:accent3>
+      <a:accent4>
+        <a:srgbClr val="0F9ED5"/>
+      </a:accent4>
+      <a:accent5>
+        <a:srgbClr val="A02B93"/>
+      </a:accent5>
+      <a:accent6>
+        <a:srgbClr val="4EA72E"/>
+      </a:accent6>
+      <a:hlink>
+        <a:srgbClr val="467886"/>
+      </a:hlink>
+      <a:folHlink>
+        <a:srgbClr val="96607D"/>
+      </a:folHlink>
+    </a:clrScheme>
+    <a:fontScheme name="Office">
+      <a:majorFont>
+        <a:latin typeface="Aptos Display" panose="02110004020202020204"/>
+        <a:ea typeface=""/>
+        <a:cs typeface=""/>
+        <a:font script="Jpan" typeface="游ゴシック Light"/>
+        <a:font script="Hang" typeface="맑은 고딕"/>
+        <a:font script="Hans" typeface="等线 Light"/>
+        <a:font script="Hant" typeface="新細明體"/>
+        <a:font script="Arab" typeface="Times New Roman"/>
+        <a:font script="Hebr" typeface="Times New Roman"/>
+        <a:font script="Thai" typeface="Angsana New"/>
+        <a:font script="Ethi" typeface="Nyala"/>
+        <a:font script="Beng" typeface="Vrinda"/>
+        <a:font script="Gujr" typeface="Shruti"/>
+        <a:font script="Khmr" typeface="MoolBoran"/>
+        <a:font script="Knda" typeface="Tunga"/>
+        <a:font script="Guru" typeface="Raavi"/>
+        <a:font script="Cans" typeface="Euphemia"/>
+        <a:font script="Cher" typeface="Plantagenet Cherokee"/>
+        <a:font script="Yiii" typeface="Microsoft Yi Baiti"/>
+        <a:font script="Tibt" typeface="Microsoft Himalaya"/>
+        <a:font script="Thaa" typeface="MV Boli"/>
+        <a:font script="Deva" typeface="Mangal"/>
+        <a:font script="Telu" typeface="Gautami"/>
+        <a:font script="Taml" typeface="Latha"/>
+        <a:font script="Syrc" typeface="Estrangelo Edessa"/>
+        <a:font script="Orya" typeface="Kalinga"/>
+        <a:font script="Mlym" typeface="Kartika"/>
+        <a:font script="Laoo" typeface="DokChampa"/>
+        <a:font script="Sinh" typeface="Iskoola Pota"/>
+        <a:font script="Mong" typeface="Mongolian Baiti"/>
+        <a:font script="Viet" typeface="Times New Roman"/>
+        <a:font script="Uigh" typeface="Microsoft Uighur"/>
+        <a:font script="Geor" typeface="Sylfaen"/>
+        <a:font script="Armn" typeface="Arial"/>
+        <a:font script="Bugi" typeface="Leelawadee UI"/>
+        <a:font script="Bopo" typeface="Microsoft JhengHei"/>
+        <a:font script="Java" typeface="Javanese Text"/>
+        <a:font script="Lisu" typeface="Segoe UI"/>
+        <a:font script="Mymr" typeface="Myanmar Text"/>
+        <a:font script="Nkoo" typeface="Ebrima"/>
+        <a:font script="Olck" typeface="Nirmala UI"/>
+        <a:font script="Osma" typeface="Ebrima"/>
+        <a:font script="Phag" typeface="Phagspa"/>
+        <a:font script="Syrn" typeface="Estrangelo Edessa"/>
+        <a:font script="Syrj" typeface="Estrangelo Edessa"/>
+        <a:font script="Syre" typeface="Estrangelo Edessa"/>
+        <a:font script="Sora" typeface="Nirmala UI"/>
+        <a:font script="Tale" typeface="Microsoft Tai Le"/>
+        <a:font script="Talu" typeface="Microsoft New Tai Lue"/>
+        <a:font script="Tfng" typeface="Ebrima"/>
+      </a:majorFont>
+      <a:minorFont>
+        <a:latin typeface="Aptos" panose="02110004020202020204"/>
+        <a:ea typeface=""/>
+        <a:cs typeface=""/>
+        <a:font script="Jpan" typeface="游ゴシック"/>
+        <a:font script="Hang" typeface="맑은 고딕"/>
+        <a:font script="Hans" typeface="等线"/>
+        <a:font script="Hant" typeface="新細明體"/>
+        <a:font script="Arab" typeface="Arial"/>
+        <a:font script="Hebr" typeface="Arial"/>
+        <a:font script="Thai" typeface="Cordia New"/>
+        <a:font script="Ethi" typeface="Nyala"/>
+        <a:font script="Beng" typeface="Vrinda"/>
+        <a:font script="Gujr" typeface="Shruti"/>
+        <a:font script="Khmr" typeface="DaunPenh"/>
+        <a:font script="Knda" typeface="Tunga"/>
+        <a:font script="Guru" typeface="Raavi"/>
+        <a:font script="Cans" typeface="Euphemia"/>
+        <a:font script="Cher" typeface="Plantagenet Cherokee"/>
+        <a:font script="Yiii" typeface="Microsoft Yi Baiti"/>
+        <a:font script="Tibt" typeface="Microsoft Himalaya"/>
+        <a:font script="Thaa" typeface="MV Boli"/>
+        <a:font script="Deva" typeface="Mangal"/>
+        <a:font script="Telu" typeface="Gautami"/>
+        <a:font script="Taml" typeface="Latha"/>
+        <a:font script="Syrc" typeface="Estrangelo Edessa"/>
+        <a:font script="Orya" typeface="Kalinga"/>
+        <a:font script="Mlym" typeface="Kartika"/>
+        <a:font script="Laoo" typeface="DokChampa"/>
+        <a:font script="Sinh" typeface="Iskoola Pota"/>
+        <a:font script="Mong" typeface="Mongolian Baiti"/>
+        <a:font script="Viet" typeface="Arial"/>
+        <a:font script="Uigh" typeface="Microsoft Uighur"/>
+        <a:font script="Geor" typeface="Sylfaen"/>
+        <a:font script="Armn" typeface="Arial"/>
+        <a:font script="Bugi" typeface="Leelawadee UI"/>
+        <a:font script="Bopo" typeface="Microsoft JhengHei"/>
+        <a:font script="Java" typeface="Javanese Text"/>
+        <a:font script="Lisu" typeface="Segoe UI"/>
+        <a:font script="Mymr" typeface="Myanmar Text"/>
+        <a:font script="Nkoo" typeface="Ebrima"/>
+        <a:font script="Olck" typeface="Nirmala UI"/>
+        <a:font script="Osma" typeface="Ebrima"/>
+        <a:font script="Phag" typeface="Phagspa"/>
+        <a:font script="Syrn" typeface="Estrangelo Edessa"/>
+        <a:font script="Syrj" typeface="Estrangelo Edessa"/>
+        <a:font script="Syre" typeface="Estrangelo Edessa"/>
+        <a:font script="Sora" typeface="Nirmala UI"/>
+        <a:font script="Tale" typeface="Microsoft Tai Le"/>
+        <a:font script="Talu" typeface="Microsoft New Tai Lue"/>
+        <a:font script="Tfng" typeface="Ebrima"/>
+      </a:minorFont>
+    </a:fontScheme>
+    <a:fmtScheme name="Office">
+      <a:fillStyleLst>
+        <a:solidFill>
+          <a:schemeClr val="phClr"/>
+        </a:solidFill>
+        <a:gradFill rotWithShape="1">
+          <a:gsLst>
+            <a:gs pos="0">
+              <a:schemeClr val="phClr">
+                <a:lumMod val="110000"/>
+                <a:satMod val="105000"/>
+                <a:tint val="67000"/>
+              </a:schemeClr>
+            </a:gs>
+            <a:gs pos="50000">
+              <a:schemeClr val="phClr">
+                <a:lumMod val="105000"/>
+                <a:satMod val="103000"/>
+                <a:tint val="73000"/>
+              </a:schemeClr>
+            </a:gs>
+            <a:gs pos="100000">
+              <a:schemeClr val="phClr">
+                <a:lumMod val="105000"/>
+                <a:satMod val="109000"/>
+                <a:tint val="81000"/>
+              </a:schemeClr>
+            </a:gs>
+          </a:gsLst>
+          <a:lin ang="5400000" scaled="0"/>
+        </a:gradFill>
+        <a:gradFill rotWithShape="1">
+          <a:gsLst>
+            <a:gs pos="0">
+              <a:schemeClr val="phClr">
+                <a:satMod val="103000"/>
+                <a:lumMod val="102000"/>
+                <a:tint val="94000"/>
+              </a:schemeClr>
+            </a:gs>
+            <a:gs pos="50000">
+              <a:schemeClr val="phClr">
+                <a:satMod val="110000"/>
+                <a:lumMod val="100000"/>
+                <a:shade val="100000"/>
+              </a:schemeClr>
+            </a:gs>
+            <a:gs pos="100000">
+              <a:schemeClr val="phClr">
+                <a:lumMod val="99000"/>
+                <a:satMod val="120000"/>
+                <a:shade val="78000"/>
+              </a:schemeClr>
+            </a:gs>
+          </a:gsLst>
+          <a:lin ang="5400000" scaled="0"/>
+        </a:gradFill>
+      </a:fillStyleLst>
+      <a:lnStyleLst>
+        <a:ln w="12700" cap="flat" cmpd="sng" algn="ctr">
+          <a:solidFill>
+            <a:schemeClr val="phClr"/>
+          </a:solidFill>
+          <a:prstDash val="solid"/>
+          <a:miter lim="800000"/>
+        </a:ln>
+        <a:ln w="19050" cap="flat" cmpd="sng" algn="ctr">
+          <a:solidFill>
+            <a:schemeClr val="phClr"/>
+          </a:solidFill>
+          <a:prstDash val="solid"/>
+          <a:miter lim="800000"/>
+        </a:ln>
+        <a:ln w="25400" cap="flat" cmpd="sng" algn="ctr">
+          <a:solidFill>
+            <a:schemeClr val="phClr"/>
+          </a:solidFill>
+          <a:prstDash val="solid"/>
+          <a:miter lim="800000"/>
+        </a:ln>
+      </a:lnStyleLst>
+      <a:effectStyleLst>
+        <a:effectStyle>
+          <a:effectLst/>
+        </a:effectStyle>
+        <a:effectStyle>
+          <a:effectLst/>
+        </a:effectStyle>
+        <a:effectStyle>
+          <a:effectLst>
+            <a:outerShdw blurRad="57150" dist="19050" dir="5400000" algn="ctr" rotWithShape="0">
+              <a:srgbClr val="000000">
+                <a:alpha val="63000"/>
+              </a:srgbClr>
+            </a:outerShdw>
+          </a:effectLst>
+        </a:effectStyle>
+      </a:effectStyleLst>
+      <a:bgFillStyleLst>
+        <a:solidFill>
+          <a:schemeClr val="phClr"/>
+        </a:solidFill>
+        <a:solidFill>
+          <a:schemeClr val="phClr">
+            <a:tint val="95000"/>
+            <a:satMod val="170000"/>
+          </a:schemeClr>
+        </a:solidFill>
+        <a:gradFill rotWithShape="1">
+          <a:gsLst>
+            <a:gs pos="0">
+              <a:schemeClr val="phClr">
+                <a:tint val="93000"/>
+                <a:satMod val="150000"/>
+                <a:shade val="98000"/>
+                <a:lumMod val="102000"/>
+              </a:schemeClr>
+            </a:gs>
+            <a:gs pos="50000">
+              <a:schemeClr val="phClr">
+                <a:tint val="98000"/>
+                <a:satMod val="130000"/>
+                <a:shade val="90000"/>
+                <a:lumMod val="103000"/>
+              </a:schemeClr>
+            </a:gs>
+            <a:gs pos="100000">
+              <a:schemeClr val="phClr">
+                <a:shade val="63000"/>
+                <a:satMod val="120000"/>
+              </a:schemeClr>
+            </a:gs>
+          </a:gsLst>
+          <a:lin ang="5400000" scaled="0"/>
+        </a:gradFill>
+      </a:bgFillStyleLst>
+    </a:fmtScheme>
+  </a:themeElements>
+  <a:objectDefaults>
+    <a:lnDef>
+      <a:spPr/>
+      <a:bodyPr/>
+      <a:lstStyle/>
+      <a:style>
+        <a:lnRef idx="2">
+          <a:schemeClr val="accent1"/>
+        </a:lnRef>
+        <a:fillRef idx="0">
+          <a:schemeClr val="accent1"/>
+        </a:fillRef>
+        <a:effectRef idx="1">
+          <a:schemeClr val="accent1"/>
+        </a:effectRef>
+        <a:fontRef idx="minor">
+          <a:schemeClr val="tx1"/>
+        </a:fontRef>
+      </a:style>
+    </a:lnDef>
+  </a:objectDefaults>
+  <a:extraClrSchemeLst/>
+  <a:extLst>
+    <a:ext uri="{05A4C25C-085E-4340-85A3-A5531E510DB2}">
+      <thm15:themeFamily xmlns:thm15="http://schemas.microsoft.com/office/thememl/2012/main" name="Office Theme" id="{2E142A2C-CD16-42D6-873A-C26D2A0506FA}" vid="{1BDDFF52-6CD6-40A5-AB3C-68EB2F1E4D0A}"/>
+    </a:ext>
+  </a:extLst>
+</a:theme>
 </file>
</xml_diff>